<commit_message>
MS project slides updated
</commit_message>
<xml_diff>
--- a/Presentations/Project Charter Presentation.pptx
+++ b/Presentations/Project Charter Presentation.pptx
@@ -5,41 +5,42 @@
     <p:sldMasterId id="2147483654" r:id="rId1"/>
   </p:sldMasterIdLst>
   <p:notesMasterIdLst>
-    <p:notesMasterId r:id="rId34"/>
+    <p:notesMasterId r:id="rId35"/>
   </p:notesMasterIdLst>
   <p:sldIdLst>
     <p:sldId id="256" r:id="rId2"/>
     <p:sldId id="257" r:id="rId3"/>
     <p:sldId id="258" r:id="rId4"/>
     <p:sldId id="287" r:id="rId5"/>
-    <p:sldId id="259" r:id="rId6"/>
-    <p:sldId id="260" r:id="rId7"/>
-    <p:sldId id="261" r:id="rId8"/>
-    <p:sldId id="262" r:id="rId9"/>
-    <p:sldId id="263" r:id="rId10"/>
-    <p:sldId id="264" r:id="rId11"/>
-    <p:sldId id="265" r:id="rId12"/>
-    <p:sldId id="266" r:id="rId13"/>
-    <p:sldId id="267" r:id="rId14"/>
-    <p:sldId id="268" r:id="rId15"/>
-    <p:sldId id="269" r:id="rId16"/>
-    <p:sldId id="270" r:id="rId17"/>
-    <p:sldId id="271" r:id="rId18"/>
-    <p:sldId id="272" r:id="rId19"/>
-    <p:sldId id="273" r:id="rId20"/>
-    <p:sldId id="274" r:id="rId21"/>
-    <p:sldId id="275" r:id="rId22"/>
-    <p:sldId id="276" r:id="rId23"/>
-    <p:sldId id="277" r:id="rId24"/>
-    <p:sldId id="278" r:id="rId25"/>
-    <p:sldId id="279" r:id="rId26"/>
-    <p:sldId id="280" r:id="rId27"/>
-    <p:sldId id="281" r:id="rId28"/>
-    <p:sldId id="282" r:id="rId29"/>
-    <p:sldId id="283" r:id="rId30"/>
-    <p:sldId id="284" r:id="rId31"/>
-    <p:sldId id="285" r:id="rId32"/>
-    <p:sldId id="286" r:id="rId33"/>
+    <p:sldId id="289" r:id="rId6"/>
+    <p:sldId id="288" r:id="rId7"/>
+    <p:sldId id="259" r:id="rId8"/>
+    <p:sldId id="260" r:id="rId9"/>
+    <p:sldId id="262" r:id="rId10"/>
+    <p:sldId id="263" r:id="rId11"/>
+    <p:sldId id="264" r:id="rId12"/>
+    <p:sldId id="265" r:id="rId13"/>
+    <p:sldId id="266" r:id="rId14"/>
+    <p:sldId id="267" r:id="rId15"/>
+    <p:sldId id="268" r:id="rId16"/>
+    <p:sldId id="269" r:id="rId17"/>
+    <p:sldId id="270" r:id="rId18"/>
+    <p:sldId id="271" r:id="rId19"/>
+    <p:sldId id="272" r:id="rId20"/>
+    <p:sldId id="273" r:id="rId21"/>
+    <p:sldId id="274" r:id="rId22"/>
+    <p:sldId id="275" r:id="rId23"/>
+    <p:sldId id="276" r:id="rId24"/>
+    <p:sldId id="277" r:id="rId25"/>
+    <p:sldId id="278" r:id="rId26"/>
+    <p:sldId id="279" r:id="rId27"/>
+    <p:sldId id="280" r:id="rId28"/>
+    <p:sldId id="281" r:id="rId29"/>
+    <p:sldId id="282" r:id="rId30"/>
+    <p:sldId id="283" r:id="rId31"/>
+    <p:sldId id="284" r:id="rId32"/>
+    <p:sldId id="285" r:id="rId33"/>
+    <p:sldId id="286" r:id="rId34"/>
   </p:sldIdLst>
   <p:sldSz cx="9144000" cy="5143500" type="screen16x9"/>
   <p:notesSz cx="6858000" cy="9144000"/>
@@ -638,120 +639,6 @@
   <p:cSld>
     <p:spTree>
       <p:nvGrpSpPr>
-        <p:cNvPr id="1" name="Shape 85"/>
-        <p:cNvGrpSpPr/>
-        <p:nvPr/>
-      </p:nvGrpSpPr>
-      <p:grpSpPr>
-        <a:xfrm>
-          <a:off x="0" y="0"/>
-          <a:ext cx="0" cy="0"/>
-          <a:chOff x="0" y="0"/>
-          <a:chExt cx="0" cy="0"/>
-        </a:xfrm>
-      </p:grpSpPr>
-      <p:sp>
-        <p:nvSpPr>
-          <p:cNvPr id="86" name="Shape 86"/>
-          <p:cNvSpPr>
-            <a:spLocks noGrp="1" noRot="1" noChangeAspect="1"/>
-          </p:cNvSpPr>
-          <p:nvPr>
-            <p:ph type="sldImg" idx="2"/>
-          </p:nvPr>
-        </p:nvSpPr>
-        <p:spPr>
-          <a:xfrm>
-            <a:off x="381187" y="685800"/>
-            <a:ext cx="6096299" cy="3429000"/>
-          </a:xfrm>
-          <a:custGeom>
-            <a:avLst/>
-            <a:gdLst/>
-            <a:ahLst/>
-            <a:cxnLst/>
-            <a:rect l="0" t="0" r="0" b="0"/>
-            <a:pathLst>
-              <a:path w="120000" h="120000" extrusionOk="0">
-                <a:moveTo>
-                  <a:pt x="0" y="0"/>
-                </a:moveTo>
-                <a:lnTo>
-                  <a:pt x="120000" y="0"/>
-                </a:lnTo>
-                <a:lnTo>
-                  <a:pt x="120000" y="120000"/>
-                </a:lnTo>
-                <a:lnTo>
-                  <a:pt x="0" y="120000"/>
-                </a:lnTo>
-                <a:close/>
-              </a:path>
-            </a:pathLst>
-          </a:custGeom>
-          <a:noFill/>
-          <a:ln w="9525" cap="flat">
-            <a:solidFill>
-              <a:srgbClr val="000000"/>
-            </a:solidFill>
-            <a:prstDash val="solid"/>
-            <a:round/>
-            <a:headEnd type="none" w="med" len="med"/>
-            <a:tailEnd type="none" w="med" len="med"/>
-          </a:ln>
-        </p:spPr>
-      </p:sp>
-      <p:sp>
-        <p:nvSpPr>
-          <p:cNvPr id="87" name="Shape 87"/>
-          <p:cNvSpPr txBox="1">
-            <a:spLocks noGrp="1"/>
-          </p:cNvSpPr>
-          <p:nvPr>
-            <p:ph type="body" idx="1"/>
-          </p:nvPr>
-        </p:nvSpPr>
-        <p:spPr>
-          <a:xfrm>
-            <a:off x="685800" y="4343400"/>
-            <a:ext cx="5486399" cy="4114800"/>
-          </a:xfrm>
-          <a:prstGeom prst="rect">
-            <a:avLst/>
-          </a:prstGeom>
-        </p:spPr>
-        <p:txBody>
-          <a:bodyPr lIns="91425" tIns="91425" rIns="91425" bIns="91425" anchor="t" anchorCtr="0">
-            <a:noAutofit/>
-          </a:bodyPr>
-          <a:lstStyle/>
-          <a:p>
-            <a:pPr>
-              <a:spcBef>
-                <a:spcPts val="0"/>
-              </a:spcBef>
-              <a:buNone/>
-            </a:pPr>
-            <a:r>
-              <a:rPr lang="en"/>
-              <a:t>Karla, </a:t>
-            </a:r>
-          </a:p>
-        </p:txBody>
-      </p:sp>
-    </p:spTree>
-  </p:cSld>
-  <p:clrMapOvr>
-    <a:masterClrMapping/>
-  </p:clrMapOvr>
-</p:notes>
-</file>
-
-<file path=ppt/notesSlides/notesSlide11.xml><?xml version="1.0" encoding="utf-8"?>
-<p:notes xmlns:a="http://schemas.openxmlformats.org/drawingml/2006/main" xmlns:r="http://schemas.openxmlformats.org/officeDocument/2006/relationships" xmlns:p="http://schemas.openxmlformats.org/presentationml/2006/main" showMasterSp="0" showMasterPhAnim="0">
-  <p:cSld>
-    <p:spTree>
-      <p:nvGrpSpPr>
         <p:cNvPr id="1" name="Shape 91"/>
         <p:cNvGrpSpPr/>
         <p:nvPr/>
@@ -861,7 +748,7 @@
 </p:notes>
 </file>
 
-<file path=ppt/notesSlides/notesSlide12.xml><?xml version="1.0" encoding="utf-8"?>
+<file path=ppt/notesSlides/notesSlide11.xml><?xml version="1.0" encoding="utf-8"?>
 <p:notes xmlns:a="http://schemas.openxmlformats.org/drawingml/2006/main" xmlns:r="http://schemas.openxmlformats.org/officeDocument/2006/relationships" xmlns:p="http://schemas.openxmlformats.org/presentationml/2006/main" showMasterSp="0" showMasterPhAnim="0">
   <p:cSld>
     <p:spTree>
@@ -975,7 +862,7 @@
 </p:notes>
 </file>
 
-<file path=ppt/notesSlides/notesSlide13.xml><?xml version="1.0" encoding="utf-8"?>
+<file path=ppt/notesSlides/notesSlide12.xml><?xml version="1.0" encoding="utf-8"?>
 <p:notes xmlns:a="http://schemas.openxmlformats.org/drawingml/2006/main" xmlns:r="http://schemas.openxmlformats.org/officeDocument/2006/relationships" xmlns:p="http://schemas.openxmlformats.org/presentationml/2006/main" showMasterSp="0" showMasterPhAnim="0">
   <p:cSld>
     <p:spTree>
@@ -1089,7 +976,7 @@
 </p:notes>
 </file>
 
-<file path=ppt/notesSlides/notesSlide14.xml><?xml version="1.0" encoding="utf-8"?>
+<file path=ppt/notesSlides/notesSlide13.xml><?xml version="1.0" encoding="utf-8"?>
 <p:notes xmlns:a="http://schemas.openxmlformats.org/drawingml/2006/main" xmlns:r="http://schemas.openxmlformats.org/officeDocument/2006/relationships" xmlns:p="http://schemas.openxmlformats.org/presentationml/2006/main" showMasterSp="0" showMasterPhAnim="0">
   <p:cSld>
     <p:spTree>
@@ -1203,7 +1090,7 @@
 </p:notes>
 </file>
 
-<file path=ppt/notesSlides/notesSlide15.xml><?xml version="1.0" encoding="utf-8"?>
+<file path=ppt/notesSlides/notesSlide14.xml><?xml version="1.0" encoding="utf-8"?>
 <p:notes xmlns:a="http://schemas.openxmlformats.org/drawingml/2006/main" xmlns:r="http://schemas.openxmlformats.org/officeDocument/2006/relationships" xmlns:p="http://schemas.openxmlformats.org/presentationml/2006/main" showMasterSp="0" showMasterPhAnim="0">
   <p:cSld>
     <p:spTree>
@@ -1317,7 +1204,7 @@
 </p:notes>
 </file>
 
-<file path=ppt/notesSlides/notesSlide16.xml><?xml version="1.0" encoding="utf-8"?>
+<file path=ppt/notesSlides/notesSlide15.xml><?xml version="1.0" encoding="utf-8"?>
 <p:notes xmlns:a="http://schemas.openxmlformats.org/drawingml/2006/main" xmlns:r="http://schemas.openxmlformats.org/officeDocument/2006/relationships" xmlns:p="http://schemas.openxmlformats.org/presentationml/2006/main" showMasterSp="0" showMasterPhAnim="0">
   <p:cSld>
     <p:spTree>
@@ -1431,7 +1318,7 @@
 </p:notes>
 </file>
 
-<file path=ppt/notesSlides/notesSlide17.xml><?xml version="1.0" encoding="utf-8"?>
+<file path=ppt/notesSlides/notesSlide16.xml><?xml version="1.0" encoding="utf-8"?>
 <p:notes xmlns:a="http://schemas.openxmlformats.org/drawingml/2006/main" xmlns:r="http://schemas.openxmlformats.org/officeDocument/2006/relationships" xmlns:p="http://schemas.openxmlformats.org/presentationml/2006/main" showMasterSp="0" showMasterPhAnim="0">
   <p:cSld>
     <p:spTree>
@@ -1545,7 +1432,7 @@
 </p:notes>
 </file>
 
-<file path=ppt/notesSlides/notesSlide18.xml><?xml version="1.0" encoding="utf-8"?>
+<file path=ppt/notesSlides/notesSlide17.xml><?xml version="1.0" encoding="utf-8"?>
 <p:notes xmlns:a="http://schemas.openxmlformats.org/drawingml/2006/main" xmlns:r="http://schemas.openxmlformats.org/officeDocument/2006/relationships" xmlns:p="http://schemas.openxmlformats.org/presentationml/2006/main" showMasterSp="0" showMasterPhAnim="0">
   <p:cSld>
     <p:spTree>
@@ -1659,7 +1546,7 @@
 </p:notes>
 </file>
 
-<file path=ppt/notesSlides/notesSlide19.xml><?xml version="1.0" encoding="utf-8"?>
+<file path=ppt/notesSlides/notesSlide18.xml><?xml version="1.0" encoding="utf-8"?>
 <p:notes xmlns:a="http://schemas.openxmlformats.org/drawingml/2006/main" xmlns:r="http://schemas.openxmlformats.org/officeDocument/2006/relationships" xmlns:p="http://schemas.openxmlformats.org/presentationml/2006/main" showMasterSp="0" showMasterPhAnim="0">
   <p:cSld>
     <p:spTree>
@@ -1761,6 +1648,120 @@
             <a:r>
               <a:rPr lang="en"/>
               <a:t>Joseph</a:t>
+            </a:r>
+          </a:p>
+        </p:txBody>
+      </p:sp>
+    </p:spTree>
+  </p:cSld>
+  <p:clrMapOvr>
+    <a:masterClrMapping/>
+  </p:clrMapOvr>
+</p:notes>
+</file>
+
+<file path=ppt/notesSlides/notesSlide19.xml><?xml version="1.0" encoding="utf-8"?>
+<p:notes xmlns:a="http://schemas.openxmlformats.org/drawingml/2006/main" xmlns:r="http://schemas.openxmlformats.org/officeDocument/2006/relationships" xmlns:p="http://schemas.openxmlformats.org/presentationml/2006/main" showMasterSp="0" showMasterPhAnim="0">
+  <p:cSld>
+    <p:spTree>
+      <p:nvGrpSpPr>
+        <p:cNvPr id="1" name="Shape 146"/>
+        <p:cNvGrpSpPr/>
+        <p:nvPr/>
+      </p:nvGrpSpPr>
+      <p:grpSpPr>
+        <a:xfrm>
+          <a:off x="0" y="0"/>
+          <a:ext cx="0" cy="0"/>
+          <a:chOff x="0" y="0"/>
+          <a:chExt cx="0" cy="0"/>
+        </a:xfrm>
+      </p:grpSpPr>
+      <p:sp>
+        <p:nvSpPr>
+          <p:cNvPr id="147" name="Shape 147"/>
+          <p:cNvSpPr>
+            <a:spLocks noGrp="1" noRot="1" noChangeAspect="1"/>
+          </p:cNvSpPr>
+          <p:nvPr>
+            <p:ph type="sldImg" idx="2"/>
+          </p:nvPr>
+        </p:nvSpPr>
+        <p:spPr>
+          <a:xfrm>
+            <a:off x="381187" y="685800"/>
+            <a:ext cx="6096299" cy="3429000"/>
+          </a:xfrm>
+          <a:custGeom>
+            <a:avLst/>
+            <a:gdLst/>
+            <a:ahLst/>
+            <a:cxnLst/>
+            <a:rect l="0" t="0" r="0" b="0"/>
+            <a:pathLst>
+              <a:path w="120000" h="120000" extrusionOk="0">
+                <a:moveTo>
+                  <a:pt x="0" y="0"/>
+                </a:moveTo>
+                <a:lnTo>
+                  <a:pt x="120000" y="0"/>
+                </a:lnTo>
+                <a:lnTo>
+                  <a:pt x="120000" y="120000"/>
+                </a:lnTo>
+                <a:lnTo>
+                  <a:pt x="0" y="120000"/>
+                </a:lnTo>
+                <a:close/>
+              </a:path>
+            </a:pathLst>
+          </a:custGeom>
+          <a:noFill/>
+          <a:ln w="9525" cap="flat">
+            <a:solidFill>
+              <a:srgbClr val="000000"/>
+            </a:solidFill>
+            <a:prstDash val="solid"/>
+            <a:round/>
+            <a:headEnd type="none" w="med" len="med"/>
+            <a:tailEnd type="none" w="med" len="med"/>
+          </a:ln>
+        </p:spPr>
+      </p:sp>
+      <p:sp>
+        <p:nvSpPr>
+          <p:cNvPr id="148" name="Shape 148"/>
+          <p:cNvSpPr txBox="1">
+            <a:spLocks noGrp="1"/>
+          </p:cNvSpPr>
+          <p:nvPr>
+            <p:ph type="body" idx="1"/>
+          </p:nvPr>
+        </p:nvSpPr>
+        <p:spPr>
+          <a:xfrm>
+            <a:off x="685800" y="4343400"/>
+            <a:ext cx="5486399" cy="4114800"/>
+          </a:xfrm>
+          <a:prstGeom prst="rect">
+            <a:avLst/>
+          </a:prstGeom>
+        </p:spPr>
+        <p:txBody>
+          <a:bodyPr lIns="91425" tIns="91425" rIns="91425" bIns="91425" anchor="t" anchorCtr="0">
+            <a:noAutofit/>
+          </a:bodyPr>
+          <a:lstStyle/>
+          <a:p>
+            <a:pPr>
+              <a:spcBef>
+                <a:spcPts val="0"/>
+              </a:spcBef>
+              <a:buNone/>
+            </a:pPr>
+            <a:r>
+              <a:rPr lang="en"/>
+              <a:t>Joe</a:t>
             </a:r>
           </a:p>
         </p:txBody>
@@ -1892,120 +1893,6 @@
   <p:cSld>
     <p:spTree>
       <p:nvGrpSpPr>
-        <p:cNvPr id="1" name="Shape 146"/>
-        <p:cNvGrpSpPr/>
-        <p:nvPr/>
-      </p:nvGrpSpPr>
-      <p:grpSpPr>
-        <a:xfrm>
-          <a:off x="0" y="0"/>
-          <a:ext cx="0" cy="0"/>
-          <a:chOff x="0" y="0"/>
-          <a:chExt cx="0" cy="0"/>
-        </a:xfrm>
-      </p:grpSpPr>
-      <p:sp>
-        <p:nvSpPr>
-          <p:cNvPr id="147" name="Shape 147"/>
-          <p:cNvSpPr>
-            <a:spLocks noGrp="1" noRot="1" noChangeAspect="1"/>
-          </p:cNvSpPr>
-          <p:nvPr>
-            <p:ph type="sldImg" idx="2"/>
-          </p:nvPr>
-        </p:nvSpPr>
-        <p:spPr>
-          <a:xfrm>
-            <a:off x="381187" y="685800"/>
-            <a:ext cx="6096299" cy="3429000"/>
-          </a:xfrm>
-          <a:custGeom>
-            <a:avLst/>
-            <a:gdLst/>
-            <a:ahLst/>
-            <a:cxnLst/>
-            <a:rect l="0" t="0" r="0" b="0"/>
-            <a:pathLst>
-              <a:path w="120000" h="120000" extrusionOk="0">
-                <a:moveTo>
-                  <a:pt x="0" y="0"/>
-                </a:moveTo>
-                <a:lnTo>
-                  <a:pt x="120000" y="0"/>
-                </a:lnTo>
-                <a:lnTo>
-                  <a:pt x="120000" y="120000"/>
-                </a:lnTo>
-                <a:lnTo>
-                  <a:pt x="0" y="120000"/>
-                </a:lnTo>
-                <a:close/>
-              </a:path>
-            </a:pathLst>
-          </a:custGeom>
-          <a:noFill/>
-          <a:ln w="9525" cap="flat">
-            <a:solidFill>
-              <a:srgbClr val="000000"/>
-            </a:solidFill>
-            <a:prstDash val="solid"/>
-            <a:round/>
-            <a:headEnd type="none" w="med" len="med"/>
-            <a:tailEnd type="none" w="med" len="med"/>
-          </a:ln>
-        </p:spPr>
-      </p:sp>
-      <p:sp>
-        <p:nvSpPr>
-          <p:cNvPr id="148" name="Shape 148"/>
-          <p:cNvSpPr txBox="1">
-            <a:spLocks noGrp="1"/>
-          </p:cNvSpPr>
-          <p:nvPr>
-            <p:ph type="body" idx="1"/>
-          </p:nvPr>
-        </p:nvSpPr>
-        <p:spPr>
-          <a:xfrm>
-            <a:off x="685800" y="4343400"/>
-            <a:ext cx="5486399" cy="4114800"/>
-          </a:xfrm>
-          <a:prstGeom prst="rect">
-            <a:avLst/>
-          </a:prstGeom>
-        </p:spPr>
-        <p:txBody>
-          <a:bodyPr lIns="91425" tIns="91425" rIns="91425" bIns="91425" anchor="t" anchorCtr="0">
-            <a:noAutofit/>
-          </a:bodyPr>
-          <a:lstStyle/>
-          <a:p>
-            <a:pPr>
-              <a:spcBef>
-                <a:spcPts val="0"/>
-              </a:spcBef>
-              <a:buNone/>
-            </a:pPr>
-            <a:r>
-              <a:rPr lang="en"/>
-              <a:t>Joe</a:t>
-            </a:r>
-          </a:p>
-        </p:txBody>
-      </p:sp>
-    </p:spTree>
-  </p:cSld>
-  <p:clrMapOvr>
-    <a:masterClrMapping/>
-  </p:clrMapOvr>
-</p:notes>
-</file>
-
-<file path=ppt/notesSlides/notesSlide21.xml><?xml version="1.0" encoding="utf-8"?>
-<p:notes xmlns:a="http://schemas.openxmlformats.org/drawingml/2006/main" xmlns:r="http://schemas.openxmlformats.org/officeDocument/2006/relationships" xmlns:p="http://schemas.openxmlformats.org/presentationml/2006/main" showMasterSp="0" showMasterPhAnim="0">
-  <p:cSld>
-    <p:spTree>
-      <p:nvGrpSpPr>
         <p:cNvPr id="1" name="Shape 152"/>
         <p:cNvGrpSpPr/>
         <p:nvPr/>
@@ -2115,7 +2002,7 @@
 </p:notes>
 </file>
 
-<file path=ppt/notesSlides/notesSlide22.xml><?xml version="1.0" encoding="utf-8"?>
+<file path=ppt/notesSlides/notesSlide21.xml><?xml version="1.0" encoding="utf-8"?>
 <p:notes xmlns:a="http://schemas.openxmlformats.org/drawingml/2006/main" xmlns:r="http://schemas.openxmlformats.org/officeDocument/2006/relationships" xmlns:p="http://schemas.openxmlformats.org/presentationml/2006/main" showMasterSp="0" showMasterPhAnim="0">
   <p:cSld>
     <p:spTree>
@@ -2229,7 +2116,7 @@
 </p:notes>
 </file>
 
-<file path=ppt/notesSlides/notesSlide23.xml><?xml version="1.0" encoding="utf-8"?>
+<file path=ppt/notesSlides/notesSlide22.xml><?xml version="1.0" encoding="utf-8"?>
 <p:notes xmlns:a="http://schemas.openxmlformats.org/drawingml/2006/main" xmlns:r="http://schemas.openxmlformats.org/officeDocument/2006/relationships" xmlns:p="http://schemas.openxmlformats.org/presentationml/2006/main" showMasterSp="0" showMasterPhAnim="0">
   <p:cSld>
     <p:spTree>
@@ -2343,7 +2230,7 @@
 </p:notes>
 </file>
 
-<file path=ppt/notesSlides/notesSlide24.xml><?xml version="1.0" encoding="utf-8"?>
+<file path=ppt/notesSlides/notesSlide23.xml><?xml version="1.0" encoding="utf-8"?>
 <p:notes xmlns:a="http://schemas.openxmlformats.org/drawingml/2006/main" xmlns:r="http://schemas.openxmlformats.org/officeDocument/2006/relationships" xmlns:p="http://schemas.openxmlformats.org/presentationml/2006/main" showMasterSp="0" showMasterPhAnim="0">
   <p:cSld>
     <p:spTree>
@@ -2457,7 +2344,7 @@
 </p:notes>
 </file>
 
-<file path=ppt/notesSlides/notesSlide25.xml><?xml version="1.0" encoding="utf-8"?>
+<file path=ppt/notesSlides/notesSlide24.xml><?xml version="1.0" encoding="utf-8"?>
 <p:notes xmlns:a="http://schemas.openxmlformats.org/drawingml/2006/main" xmlns:r="http://schemas.openxmlformats.org/officeDocument/2006/relationships" xmlns:p="http://schemas.openxmlformats.org/presentationml/2006/main" showMasterSp="0" showMasterPhAnim="0">
   <p:cSld>
     <p:spTree>
@@ -2571,7 +2458,7 @@
 </p:notes>
 </file>
 
-<file path=ppt/notesSlides/notesSlide26.xml><?xml version="1.0" encoding="utf-8"?>
+<file path=ppt/notesSlides/notesSlide25.xml><?xml version="1.0" encoding="utf-8"?>
 <p:notes xmlns:a="http://schemas.openxmlformats.org/drawingml/2006/main" xmlns:r="http://schemas.openxmlformats.org/officeDocument/2006/relationships" xmlns:p="http://schemas.openxmlformats.org/presentationml/2006/main" showMasterSp="0" showMasterPhAnim="0">
   <p:cSld>
     <p:spTree>
@@ -2685,7 +2572,7 @@
 </p:notes>
 </file>
 
-<file path=ppt/notesSlides/notesSlide27.xml><?xml version="1.0" encoding="utf-8"?>
+<file path=ppt/notesSlides/notesSlide26.xml><?xml version="1.0" encoding="utf-8"?>
 <p:notes xmlns:a="http://schemas.openxmlformats.org/drawingml/2006/main" xmlns:r="http://schemas.openxmlformats.org/officeDocument/2006/relationships" xmlns:p="http://schemas.openxmlformats.org/presentationml/2006/main" showMasterSp="0" showMasterPhAnim="0">
   <p:cSld>
     <p:spTree>
@@ -2799,7 +2686,7 @@
 </p:notes>
 </file>
 
-<file path=ppt/notesSlides/notesSlide28.xml><?xml version="1.0" encoding="utf-8"?>
+<file path=ppt/notesSlides/notesSlide27.xml><?xml version="1.0" encoding="utf-8"?>
 <p:notes xmlns:a="http://schemas.openxmlformats.org/drawingml/2006/main" xmlns:r="http://schemas.openxmlformats.org/officeDocument/2006/relationships" xmlns:p="http://schemas.openxmlformats.org/presentationml/2006/main" showMasterSp="0" showMasterPhAnim="0">
   <p:cSld>
     <p:spTree>
@@ -2913,7 +2800,7 @@
 </p:notes>
 </file>
 
-<file path=ppt/notesSlides/notesSlide29.xml><?xml version="1.0" encoding="utf-8"?>
+<file path=ppt/notesSlides/notesSlide28.xml><?xml version="1.0" encoding="utf-8"?>
 <p:notes xmlns:a="http://schemas.openxmlformats.org/drawingml/2006/main" xmlns:r="http://schemas.openxmlformats.org/officeDocument/2006/relationships" xmlns:p="http://schemas.openxmlformats.org/presentationml/2006/main" showMasterSp="0" showMasterPhAnim="0">
   <p:cSld>
     <p:spTree>
@@ -3027,121 +2914,7 @@
 </p:notes>
 </file>
 
-<file path=ppt/notesSlides/notesSlide3.xml><?xml version="1.0" encoding="utf-8"?>
-<p:notes xmlns:a="http://schemas.openxmlformats.org/drawingml/2006/main" xmlns:r="http://schemas.openxmlformats.org/officeDocument/2006/relationships" xmlns:p="http://schemas.openxmlformats.org/presentationml/2006/main" showMasterSp="0" showMasterPhAnim="0">
-  <p:cSld>
-    <p:spTree>
-      <p:nvGrpSpPr>
-        <p:cNvPr id="1" name="Shape 47"/>
-        <p:cNvGrpSpPr/>
-        <p:nvPr/>
-      </p:nvGrpSpPr>
-      <p:grpSpPr>
-        <a:xfrm>
-          <a:off x="0" y="0"/>
-          <a:ext cx="0" cy="0"/>
-          <a:chOff x="0" y="0"/>
-          <a:chExt cx="0" cy="0"/>
-        </a:xfrm>
-      </p:grpSpPr>
-      <p:sp>
-        <p:nvSpPr>
-          <p:cNvPr id="48" name="Shape 48"/>
-          <p:cNvSpPr>
-            <a:spLocks noGrp="1" noRot="1" noChangeAspect="1"/>
-          </p:cNvSpPr>
-          <p:nvPr>
-            <p:ph type="sldImg" idx="2"/>
-          </p:nvPr>
-        </p:nvSpPr>
-        <p:spPr>
-          <a:xfrm>
-            <a:off x="381187" y="685800"/>
-            <a:ext cx="6096299" cy="3429000"/>
-          </a:xfrm>
-          <a:custGeom>
-            <a:avLst/>
-            <a:gdLst/>
-            <a:ahLst/>
-            <a:cxnLst/>
-            <a:rect l="0" t="0" r="0" b="0"/>
-            <a:pathLst>
-              <a:path w="120000" h="120000" extrusionOk="0">
-                <a:moveTo>
-                  <a:pt x="0" y="0"/>
-                </a:moveTo>
-                <a:lnTo>
-                  <a:pt x="120000" y="0"/>
-                </a:lnTo>
-                <a:lnTo>
-                  <a:pt x="120000" y="120000"/>
-                </a:lnTo>
-                <a:lnTo>
-                  <a:pt x="0" y="120000"/>
-                </a:lnTo>
-                <a:close/>
-              </a:path>
-            </a:pathLst>
-          </a:custGeom>
-          <a:noFill/>
-          <a:ln w="9525" cap="flat">
-            <a:solidFill>
-              <a:srgbClr val="000000"/>
-            </a:solidFill>
-            <a:prstDash val="solid"/>
-            <a:round/>
-            <a:headEnd type="none" w="med" len="med"/>
-            <a:tailEnd type="none" w="med" len="med"/>
-          </a:ln>
-        </p:spPr>
-      </p:sp>
-      <p:sp>
-        <p:nvSpPr>
-          <p:cNvPr id="49" name="Shape 49"/>
-          <p:cNvSpPr txBox="1">
-            <a:spLocks noGrp="1"/>
-          </p:cNvSpPr>
-          <p:nvPr>
-            <p:ph type="body" idx="1"/>
-          </p:nvPr>
-        </p:nvSpPr>
-        <p:spPr>
-          <a:xfrm>
-            <a:off x="685800" y="4343400"/>
-            <a:ext cx="5486399" cy="4114800"/>
-          </a:xfrm>
-          <a:prstGeom prst="rect">
-            <a:avLst/>
-          </a:prstGeom>
-        </p:spPr>
-        <p:txBody>
-          <a:bodyPr lIns="91425" tIns="91425" rIns="91425" bIns="91425" anchor="t" anchorCtr="0">
-            <a:noAutofit/>
-          </a:bodyPr>
-          <a:lstStyle/>
-          <a:p>
-            <a:pPr>
-              <a:spcBef>
-                <a:spcPts val="0"/>
-              </a:spcBef>
-              <a:buNone/>
-            </a:pPr>
-            <a:r>
-              <a:rPr lang="en" dirty="0"/>
-              <a:t>Carlos</a:t>
-            </a:r>
-          </a:p>
-        </p:txBody>
-      </p:sp>
-    </p:spTree>
-  </p:cSld>
-  <p:clrMapOvr>
-    <a:masterClrMapping/>
-  </p:clrMapOvr>
-</p:notes>
-</file>
-
-<file path=ppt/notesSlides/notesSlide30.xml><?xml version="1.0" encoding="utf-8"?>
+<file path=ppt/notesSlides/notesSlide29.xml><?xml version="1.0" encoding="utf-8"?>
 <p:notes xmlns:a="http://schemas.openxmlformats.org/drawingml/2006/main" xmlns:r="http://schemas.openxmlformats.org/officeDocument/2006/relationships" xmlns:p="http://schemas.openxmlformats.org/presentationml/2006/main" showMasterSp="0" showMasterPhAnim="0">
   <p:cSld>
     <p:spTree>
@@ -3255,7 +3028,121 @@
 </p:notes>
 </file>
 
-<file path=ppt/notesSlides/notesSlide31.xml><?xml version="1.0" encoding="utf-8"?>
+<file path=ppt/notesSlides/notesSlide3.xml><?xml version="1.0" encoding="utf-8"?>
+<p:notes xmlns:a="http://schemas.openxmlformats.org/drawingml/2006/main" xmlns:r="http://schemas.openxmlformats.org/officeDocument/2006/relationships" xmlns:p="http://schemas.openxmlformats.org/presentationml/2006/main" showMasterSp="0" showMasterPhAnim="0">
+  <p:cSld>
+    <p:spTree>
+      <p:nvGrpSpPr>
+        <p:cNvPr id="1" name="Shape 47"/>
+        <p:cNvGrpSpPr/>
+        <p:nvPr/>
+      </p:nvGrpSpPr>
+      <p:grpSpPr>
+        <a:xfrm>
+          <a:off x="0" y="0"/>
+          <a:ext cx="0" cy="0"/>
+          <a:chOff x="0" y="0"/>
+          <a:chExt cx="0" cy="0"/>
+        </a:xfrm>
+      </p:grpSpPr>
+      <p:sp>
+        <p:nvSpPr>
+          <p:cNvPr id="48" name="Shape 48"/>
+          <p:cNvSpPr>
+            <a:spLocks noGrp="1" noRot="1" noChangeAspect="1"/>
+          </p:cNvSpPr>
+          <p:nvPr>
+            <p:ph type="sldImg" idx="2"/>
+          </p:nvPr>
+        </p:nvSpPr>
+        <p:spPr>
+          <a:xfrm>
+            <a:off x="381000" y="685800"/>
+            <a:ext cx="6096000" cy="3429000"/>
+          </a:xfrm>
+          <a:custGeom>
+            <a:avLst/>
+            <a:gdLst/>
+            <a:ahLst/>
+            <a:cxnLst/>
+            <a:rect l="0" t="0" r="0" b="0"/>
+            <a:pathLst>
+              <a:path w="120000" h="120000" extrusionOk="0">
+                <a:moveTo>
+                  <a:pt x="0" y="0"/>
+                </a:moveTo>
+                <a:lnTo>
+                  <a:pt x="120000" y="0"/>
+                </a:lnTo>
+                <a:lnTo>
+                  <a:pt x="120000" y="120000"/>
+                </a:lnTo>
+                <a:lnTo>
+                  <a:pt x="0" y="120000"/>
+                </a:lnTo>
+                <a:close/>
+              </a:path>
+            </a:pathLst>
+          </a:custGeom>
+          <a:noFill/>
+          <a:ln w="9525" cap="flat">
+            <a:solidFill>
+              <a:srgbClr val="000000"/>
+            </a:solidFill>
+            <a:prstDash val="solid"/>
+            <a:round/>
+            <a:headEnd type="none" w="med" len="med"/>
+            <a:tailEnd type="none" w="med" len="med"/>
+          </a:ln>
+        </p:spPr>
+      </p:sp>
+      <p:sp>
+        <p:nvSpPr>
+          <p:cNvPr id="49" name="Shape 49"/>
+          <p:cNvSpPr txBox="1">
+            <a:spLocks noGrp="1"/>
+          </p:cNvSpPr>
+          <p:nvPr>
+            <p:ph type="body" idx="1"/>
+          </p:nvPr>
+        </p:nvSpPr>
+        <p:spPr>
+          <a:xfrm>
+            <a:off x="685800" y="4343400"/>
+            <a:ext cx="5486399" cy="4114800"/>
+          </a:xfrm>
+          <a:prstGeom prst="rect">
+            <a:avLst/>
+          </a:prstGeom>
+        </p:spPr>
+        <p:txBody>
+          <a:bodyPr lIns="91425" tIns="91425" rIns="91425" bIns="91425" anchor="t" anchorCtr="0">
+            <a:noAutofit/>
+          </a:bodyPr>
+          <a:lstStyle/>
+          <a:p>
+            <a:pPr>
+              <a:spcBef>
+                <a:spcPts val="0"/>
+              </a:spcBef>
+              <a:buNone/>
+            </a:pPr>
+            <a:r>
+              <a:rPr lang="en" dirty="0"/>
+              <a:t>Carlos</a:t>
+            </a:r>
+          </a:p>
+        </p:txBody>
+      </p:sp>
+    </p:spTree>
+  </p:cSld>
+  <p:clrMapOvr>
+    <a:masterClrMapping/>
+  </p:clrMapOvr>
+</p:notes>
+</file>
+
+<file path=ppt/notesSlides/notesSlide30.xml><?xml version="1.0" encoding="utf-8"?>
 <p:notes xmlns:a="http://schemas.openxmlformats.org/drawingml/2006/main" xmlns:r="http://schemas.openxmlformats.org/officeDocument/2006/relationships" xmlns:p="http://schemas.openxmlformats.org/presentationml/2006/main" showMasterSp="0" showMasterPhAnim="0">
   <p:cSld>
     <p:spTree>
@@ -3369,7 +3256,7 @@
 </p:notes>
 </file>
 
-<file path=ppt/notesSlides/notesSlide32.xml><?xml version="1.0" encoding="utf-8"?>
+<file path=ppt/notesSlides/notesSlide31.xml><?xml version="1.0" encoding="utf-8"?>
 <p:notes xmlns:a="http://schemas.openxmlformats.org/drawingml/2006/main" xmlns:r="http://schemas.openxmlformats.org/officeDocument/2006/relationships" xmlns:p="http://schemas.openxmlformats.org/presentationml/2006/main" showMasterSp="0" showMasterPhAnim="0">
   <p:cSld>
     <p:spTree>
@@ -3787,120 +3674,6 @@
   <p:cSld>
     <p:spTree>
       <p:nvGrpSpPr>
-        <p:cNvPr id="1" name="Shape 67"/>
-        <p:cNvGrpSpPr/>
-        <p:nvPr/>
-      </p:nvGrpSpPr>
-      <p:grpSpPr>
-        <a:xfrm>
-          <a:off x="0" y="0"/>
-          <a:ext cx="0" cy="0"/>
-          <a:chOff x="0" y="0"/>
-          <a:chExt cx="0" cy="0"/>
-        </a:xfrm>
-      </p:grpSpPr>
-      <p:sp>
-        <p:nvSpPr>
-          <p:cNvPr id="68" name="Shape 68"/>
-          <p:cNvSpPr>
-            <a:spLocks noGrp="1" noRot="1" noChangeAspect="1"/>
-          </p:cNvSpPr>
-          <p:nvPr>
-            <p:ph type="sldImg" idx="2"/>
-          </p:nvPr>
-        </p:nvSpPr>
-        <p:spPr>
-          <a:xfrm>
-            <a:off x="381187" y="685800"/>
-            <a:ext cx="6096299" cy="3429000"/>
-          </a:xfrm>
-          <a:custGeom>
-            <a:avLst/>
-            <a:gdLst/>
-            <a:ahLst/>
-            <a:cxnLst/>
-            <a:rect l="0" t="0" r="0" b="0"/>
-            <a:pathLst>
-              <a:path w="120000" h="120000" extrusionOk="0">
-                <a:moveTo>
-                  <a:pt x="0" y="0"/>
-                </a:moveTo>
-                <a:lnTo>
-                  <a:pt x="120000" y="0"/>
-                </a:lnTo>
-                <a:lnTo>
-                  <a:pt x="120000" y="120000"/>
-                </a:lnTo>
-                <a:lnTo>
-                  <a:pt x="0" y="120000"/>
-                </a:lnTo>
-                <a:close/>
-              </a:path>
-            </a:pathLst>
-          </a:custGeom>
-          <a:noFill/>
-          <a:ln w="9525" cap="flat">
-            <a:solidFill>
-              <a:srgbClr val="000000"/>
-            </a:solidFill>
-            <a:prstDash val="solid"/>
-            <a:round/>
-            <a:headEnd type="none" w="med" len="med"/>
-            <a:tailEnd type="none" w="med" len="med"/>
-          </a:ln>
-        </p:spPr>
-      </p:sp>
-      <p:sp>
-        <p:nvSpPr>
-          <p:cNvPr id="69" name="Shape 69"/>
-          <p:cNvSpPr txBox="1">
-            <a:spLocks noGrp="1"/>
-          </p:cNvSpPr>
-          <p:nvPr>
-            <p:ph type="body" idx="1"/>
-          </p:nvPr>
-        </p:nvSpPr>
-        <p:spPr>
-          <a:xfrm>
-            <a:off x="685800" y="4343400"/>
-            <a:ext cx="5486399" cy="4114800"/>
-          </a:xfrm>
-          <a:prstGeom prst="rect">
-            <a:avLst/>
-          </a:prstGeom>
-        </p:spPr>
-        <p:txBody>
-          <a:bodyPr lIns="91425" tIns="91425" rIns="91425" bIns="91425" anchor="t" anchorCtr="0">
-            <a:noAutofit/>
-          </a:bodyPr>
-          <a:lstStyle/>
-          <a:p>
-            <a:pPr>
-              <a:spcBef>
-                <a:spcPts val="0"/>
-              </a:spcBef>
-              <a:buNone/>
-            </a:pPr>
-            <a:r>
-              <a:rPr lang="en"/>
-              <a:t>Carlos</a:t>
-            </a:r>
-          </a:p>
-        </p:txBody>
-      </p:sp>
-    </p:spTree>
-  </p:cSld>
-  <p:clrMapOvr>
-    <a:masterClrMapping/>
-  </p:clrMapOvr>
-</p:notes>
-</file>
-
-<file path=ppt/notesSlides/notesSlide8.xml><?xml version="1.0" encoding="utf-8"?>
-<p:notes xmlns:a="http://schemas.openxmlformats.org/drawingml/2006/main" xmlns:r="http://schemas.openxmlformats.org/officeDocument/2006/relationships" xmlns:p="http://schemas.openxmlformats.org/presentationml/2006/main" showMasterSp="0" showMasterPhAnim="0">
-  <p:cSld>
-    <p:spTree>
-      <p:nvGrpSpPr>
         <p:cNvPr id="1" name="Shape 73"/>
         <p:cNvGrpSpPr/>
         <p:nvPr/>
@@ -3925,8 +3698,8 @@
         </p:nvSpPr>
         <p:spPr>
           <a:xfrm>
-            <a:off x="381187" y="685800"/>
-            <a:ext cx="6096299" cy="3429000"/>
+            <a:off x="381000" y="685800"/>
+            <a:ext cx="6096000" cy="3429000"/>
           </a:xfrm>
           <a:custGeom>
             <a:avLst/>
@@ -4010,7 +3783,7 @@
 </p:notes>
 </file>
 
-<file path=ppt/notesSlides/notesSlide9.xml><?xml version="1.0" encoding="utf-8"?>
+<file path=ppt/notesSlides/notesSlide8.xml><?xml version="1.0" encoding="utf-8"?>
 <p:notes xmlns:a="http://schemas.openxmlformats.org/drawingml/2006/main" xmlns:r="http://schemas.openxmlformats.org/officeDocument/2006/relationships" xmlns:p="http://schemas.openxmlformats.org/presentationml/2006/main" showMasterSp="0" showMasterPhAnim="0">
   <p:cSld>
     <p:spTree>
@@ -4112,6 +3885,120 @@
             <a:r>
               <a:rPr lang="en"/>
               <a:t>Karla, Carlos &amp; Joe prepare in case Karla doesn’t show up, slides 8 thru 12</a:t>
+            </a:r>
+          </a:p>
+        </p:txBody>
+      </p:sp>
+    </p:spTree>
+  </p:cSld>
+  <p:clrMapOvr>
+    <a:masterClrMapping/>
+  </p:clrMapOvr>
+</p:notes>
+</file>
+
+<file path=ppt/notesSlides/notesSlide9.xml><?xml version="1.0" encoding="utf-8"?>
+<p:notes xmlns:a="http://schemas.openxmlformats.org/drawingml/2006/main" xmlns:r="http://schemas.openxmlformats.org/officeDocument/2006/relationships" xmlns:p="http://schemas.openxmlformats.org/presentationml/2006/main" showMasterSp="0" showMasterPhAnim="0">
+  <p:cSld>
+    <p:spTree>
+      <p:nvGrpSpPr>
+        <p:cNvPr id="1" name="Shape 85"/>
+        <p:cNvGrpSpPr/>
+        <p:nvPr/>
+      </p:nvGrpSpPr>
+      <p:grpSpPr>
+        <a:xfrm>
+          <a:off x="0" y="0"/>
+          <a:ext cx="0" cy="0"/>
+          <a:chOff x="0" y="0"/>
+          <a:chExt cx="0" cy="0"/>
+        </a:xfrm>
+      </p:grpSpPr>
+      <p:sp>
+        <p:nvSpPr>
+          <p:cNvPr id="86" name="Shape 86"/>
+          <p:cNvSpPr>
+            <a:spLocks noGrp="1" noRot="1" noChangeAspect="1"/>
+          </p:cNvSpPr>
+          <p:nvPr>
+            <p:ph type="sldImg" idx="2"/>
+          </p:nvPr>
+        </p:nvSpPr>
+        <p:spPr>
+          <a:xfrm>
+            <a:off x="381187" y="685800"/>
+            <a:ext cx="6096299" cy="3429000"/>
+          </a:xfrm>
+          <a:custGeom>
+            <a:avLst/>
+            <a:gdLst/>
+            <a:ahLst/>
+            <a:cxnLst/>
+            <a:rect l="0" t="0" r="0" b="0"/>
+            <a:pathLst>
+              <a:path w="120000" h="120000" extrusionOk="0">
+                <a:moveTo>
+                  <a:pt x="0" y="0"/>
+                </a:moveTo>
+                <a:lnTo>
+                  <a:pt x="120000" y="0"/>
+                </a:lnTo>
+                <a:lnTo>
+                  <a:pt x="120000" y="120000"/>
+                </a:lnTo>
+                <a:lnTo>
+                  <a:pt x="0" y="120000"/>
+                </a:lnTo>
+                <a:close/>
+              </a:path>
+            </a:pathLst>
+          </a:custGeom>
+          <a:noFill/>
+          <a:ln w="9525" cap="flat">
+            <a:solidFill>
+              <a:srgbClr val="000000"/>
+            </a:solidFill>
+            <a:prstDash val="solid"/>
+            <a:round/>
+            <a:headEnd type="none" w="med" len="med"/>
+            <a:tailEnd type="none" w="med" len="med"/>
+          </a:ln>
+        </p:spPr>
+      </p:sp>
+      <p:sp>
+        <p:nvSpPr>
+          <p:cNvPr id="87" name="Shape 87"/>
+          <p:cNvSpPr txBox="1">
+            <a:spLocks noGrp="1"/>
+          </p:cNvSpPr>
+          <p:nvPr>
+            <p:ph type="body" idx="1"/>
+          </p:nvPr>
+        </p:nvSpPr>
+        <p:spPr>
+          <a:xfrm>
+            <a:off x="685800" y="4343400"/>
+            <a:ext cx="5486399" cy="4114800"/>
+          </a:xfrm>
+          <a:prstGeom prst="rect">
+            <a:avLst/>
+          </a:prstGeom>
+        </p:spPr>
+        <p:txBody>
+          <a:bodyPr lIns="91425" tIns="91425" rIns="91425" bIns="91425" anchor="t" anchorCtr="0">
+            <a:noAutofit/>
+          </a:bodyPr>
+          <a:lstStyle/>
+          <a:p>
+            <a:pPr>
+              <a:spcBef>
+                <a:spcPts val="0"/>
+              </a:spcBef>
+              <a:buNone/>
+            </a:pPr>
+            <a:r>
+              <a:rPr lang="en"/>
+              <a:t>Karla, </a:t>
             </a:r>
           </a:p>
         </p:txBody>
@@ -6619,13 +6506,224 @@
   <p:clrMapOvr>
     <a:masterClrMapping/>
   </p:clrMapOvr>
-  <p:transition xmlns:p14="http://schemas.microsoft.com/office/powerpoint/2010/main" spd="slow">
+  <p:transition spd="slow">
     <p:cut/>
   </p:transition>
+  <p:timing>
+    <p:tnLst>
+      <p:par>
+        <p:cTn id="1" dur="indefinite" restart="never" nodeType="tmRoot"/>
+      </p:par>
+    </p:tnLst>
+  </p:timing>
 </p:sld>
 </file>
 
 <file path=ppt/slides/slide10.xml><?xml version="1.0" encoding="utf-8"?>
+<p:sld xmlns:a="http://schemas.openxmlformats.org/drawingml/2006/main" xmlns:r="http://schemas.openxmlformats.org/officeDocument/2006/relationships" xmlns:p="http://schemas.openxmlformats.org/presentationml/2006/main">
+  <p:cSld>
+    <p:spTree>
+      <p:nvGrpSpPr>
+        <p:cNvPr id="1" name="Shape 76"/>
+        <p:cNvGrpSpPr/>
+        <p:nvPr/>
+      </p:nvGrpSpPr>
+      <p:grpSpPr>
+        <a:xfrm>
+          <a:off x="0" y="0"/>
+          <a:ext cx="0" cy="0"/>
+          <a:chOff x="0" y="0"/>
+          <a:chExt cx="0" cy="0"/>
+        </a:xfrm>
+      </p:grpSpPr>
+      <p:sp>
+        <p:nvSpPr>
+          <p:cNvPr id="77" name="Shape 77"/>
+          <p:cNvSpPr txBox="1">
+            <a:spLocks noGrp="1"/>
+          </p:cNvSpPr>
+          <p:nvPr>
+            <p:ph type="title"/>
+          </p:nvPr>
+        </p:nvSpPr>
+        <p:spPr>
+          <a:xfrm>
+            <a:off x="457200" y="205978"/>
+            <a:ext cx="8229600" cy="857400"/>
+          </a:xfrm>
+          <a:prstGeom prst="rect">
+            <a:avLst/>
+          </a:prstGeom>
+        </p:spPr>
+        <p:txBody>
+          <a:bodyPr lIns="91425" tIns="91425" rIns="91425" bIns="91425" anchor="b" anchorCtr="0">
+            <a:noAutofit/>
+          </a:bodyPr>
+          <a:lstStyle/>
+          <a:p>
+            <a:pPr marL="0" marR="0" indent="0" algn="ctr" rtl="0">
+              <a:lnSpc>
+                <a:spcPct val="100000"/>
+              </a:lnSpc>
+              <a:spcBef>
+                <a:spcPts val="0"/>
+              </a:spcBef>
+              <a:spcAft>
+                <a:spcPts val="0"/>
+              </a:spcAft>
+              <a:buNone/>
+            </a:pPr>
+            <a:r>
+              <a:rPr lang="en" dirty="0"/>
+              <a:t>General Organization</a:t>
+            </a:r>
+          </a:p>
+        </p:txBody>
+      </p:sp>
+      <p:sp>
+        <p:nvSpPr>
+          <p:cNvPr id="78" name="Shape 78"/>
+          <p:cNvSpPr txBox="1">
+            <a:spLocks noGrp="1"/>
+          </p:cNvSpPr>
+          <p:nvPr>
+            <p:ph type="body" idx="1"/>
+          </p:nvPr>
+        </p:nvSpPr>
+        <p:spPr>
+          <a:xfrm>
+            <a:off x="457200" y="1200150"/>
+            <a:ext cx="8229600" cy="3725699"/>
+          </a:xfrm>
+          <a:prstGeom prst="rect">
+            <a:avLst/>
+          </a:prstGeom>
+        </p:spPr>
+        <p:txBody>
+          <a:bodyPr lIns="91425" tIns="91425" rIns="91425" bIns="91425" anchor="t" anchorCtr="0">
+            <a:noAutofit/>
+          </a:bodyPr>
+          <a:lstStyle/>
+          <a:p>
+            <a:pPr marL="0" marR="0" indent="0" algn="l" rtl="0">
+              <a:lnSpc>
+                <a:spcPct val="115000"/>
+              </a:lnSpc>
+              <a:spcBef>
+                <a:spcPts val="800"/>
+              </a:spcBef>
+              <a:spcAft>
+                <a:spcPts val="0"/>
+              </a:spcAft>
+              <a:buNone/>
+            </a:pPr>
+            <a:r>
+              <a:rPr lang="en" sz="2400"/>
+              <a:t>•Project Manager: Karla Hernandez</a:t>
+            </a:r>
+          </a:p>
+          <a:p>
+            <a:pPr marL="0" marR="0" indent="0" algn="l" rtl="0">
+              <a:lnSpc>
+                <a:spcPct val="115000"/>
+              </a:lnSpc>
+              <a:spcBef>
+                <a:spcPts val="800"/>
+              </a:spcBef>
+              <a:spcAft>
+                <a:spcPts val="0"/>
+              </a:spcAft>
+              <a:buNone/>
+            </a:pPr>
+            <a:r>
+              <a:rPr lang="en" sz="2400"/>
+              <a:t>•Responsibilities:</a:t>
+            </a:r>
+          </a:p>
+          <a:p>
+            <a:pPr marL="457200" marR="0" indent="0" algn="l" rtl="0">
+              <a:lnSpc>
+                <a:spcPct val="115000"/>
+              </a:lnSpc>
+              <a:spcBef>
+                <a:spcPts val="800"/>
+              </a:spcBef>
+              <a:spcAft>
+                <a:spcPts val="0"/>
+              </a:spcAft>
+              <a:buNone/>
+            </a:pPr>
+            <a:r>
+              <a:rPr lang="en" sz="2400"/>
+              <a:t>–Guiding team</a:t>
+            </a:r>
+          </a:p>
+          <a:p>
+            <a:pPr marL="457200" marR="0" indent="0" algn="l" rtl="0">
+              <a:lnSpc>
+                <a:spcPct val="115000"/>
+              </a:lnSpc>
+              <a:spcBef>
+                <a:spcPts val="800"/>
+              </a:spcBef>
+              <a:spcAft>
+                <a:spcPts val="0"/>
+              </a:spcAft>
+              <a:buNone/>
+            </a:pPr>
+            <a:r>
+              <a:rPr lang="en" sz="2400"/>
+              <a:t>–Main point of contact with sponsor</a:t>
+            </a:r>
+          </a:p>
+          <a:p>
+            <a:pPr marL="457200" marR="0" indent="0" algn="l" rtl="0">
+              <a:lnSpc>
+                <a:spcPct val="115000"/>
+              </a:lnSpc>
+              <a:spcBef>
+                <a:spcPts val="800"/>
+              </a:spcBef>
+              <a:spcAft>
+                <a:spcPts val="0"/>
+              </a:spcAft>
+              <a:buNone/>
+            </a:pPr>
+            <a:r>
+              <a:rPr lang="en" sz="2400"/>
+              <a:t>–Schedules team meetings</a:t>
+            </a:r>
+          </a:p>
+          <a:p>
+            <a:pPr>
+              <a:spcBef>
+                <a:spcPts val="0"/>
+              </a:spcBef>
+              <a:buNone/>
+            </a:pPr>
+            <a:endParaRPr/>
+          </a:p>
+        </p:txBody>
+      </p:sp>
+    </p:spTree>
+  </p:cSld>
+  <p:clrMapOvr>
+    <a:masterClrMapping/>
+  </p:clrMapOvr>
+  <p:transition spd="slow">
+    <p:cut/>
+  </p:transition>
+  <p:timing>
+    <p:tnLst>
+      <p:par>
+        <p:cTn id="1" dur="indefinite" restart="never" nodeType="tmRoot"/>
+      </p:par>
+    </p:tnLst>
+  </p:timing>
+</p:sld>
+</file>
+
+<file path=ppt/slides/slide11.xml><?xml version="1.0" encoding="utf-8"?>
 <p:sld xmlns:a="http://schemas.openxmlformats.org/drawingml/2006/main" xmlns:r="http://schemas.openxmlformats.org/officeDocument/2006/relationships" xmlns:p="http://schemas.openxmlformats.org/presentationml/2006/main">
   <p:cSld>
     <p:spTree>
@@ -6780,13 +6878,20 @@
   <p:clrMapOvr>
     <a:masterClrMapping/>
   </p:clrMapOvr>
-  <p:transition xmlns:p14="http://schemas.microsoft.com/office/powerpoint/2010/main" spd="slow">
+  <p:transition spd="slow">
     <p:cut/>
   </p:transition>
+  <p:timing>
+    <p:tnLst>
+      <p:par>
+        <p:cTn id="1" dur="indefinite" restart="never" nodeType="tmRoot"/>
+      </p:par>
+    </p:tnLst>
+  </p:timing>
 </p:sld>
 </file>
 
-<file path=ppt/slides/slide11.xml><?xml version="1.0" encoding="utf-8"?>
+<file path=ppt/slides/slide12.xml><?xml version="1.0" encoding="utf-8"?>
 <p:sld xmlns:a="http://schemas.openxmlformats.org/drawingml/2006/main" xmlns:r="http://schemas.openxmlformats.org/officeDocument/2006/relationships" xmlns:p="http://schemas.openxmlformats.org/presentationml/2006/main">
   <p:cSld>
     <p:spTree>
@@ -7031,13 +7136,20 @@
   <p:clrMapOvr>
     <a:masterClrMapping/>
   </p:clrMapOvr>
-  <p:transition xmlns:p14="http://schemas.microsoft.com/office/powerpoint/2010/main" spd="slow">
+  <p:transition spd="slow">
     <p:cut/>
   </p:transition>
+  <p:timing>
+    <p:tnLst>
+      <p:par>
+        <p:cTn id="1" dur="indefinite" restart="never" nodeType="tmRoot"/>
+      </p:par>
+    </p:tnLst>
+  </p:timing>
 </p:sld>
 </file>
 
-<file path=ppt/slides/slide12.xml><?xml version="1.0" encoding="utf-8"?>
+<file path=ppt/slides/slide13.xml><?xml version="1.0" encoding="utf-8"?>
 <p:sld xmlns:a="http://schemas.openxmlformats.org/drawingml/2006/main" xmlns:r="http://schemas.openxmlformats.org/officeDocument/2006/relationships" xmlns:p="http://schemas.openxmlformats.org/presentationml/2006/main">
   <p:cSld>
     <p:spTree>
@@ -7300,13 +7412,20 @@
   <p:clrMapOvr>
     <a:masterClrMapping/>
   </p:clrMapOvr>
-  <p:transition xmlns:p14="http://schemas.microsoft.com/office/powerpoint/2010/main" spd="slow">
+  <p:transition spd="slow">
     <p:cut/>
   </p:transition>
+  <p:timing>
+    <p:tnLst>
+      <p:par>
+        <p:cTn id="1" dur="indefinite" restart="never" nodeType="tmRoot"/>
+      </p:par>
+    </p:tnLst>
+  </p:timing>
 </p:sld>
 </file>
 
-<file path=ppt/slides/slide13.xml><?xml version="1.0" encoding="utf-8"?>
+<file path=ppt/slides/slide14.xml><?xml version="1.0" encoding="utf-8"?>
 <p:sld xmlns:a="http://schemas.openxmlformats.org/drawingml/2006/main" xmlns:r="http://schemas.openxmlformats.org/officeDocument/2006/relationships" xmlns:p="http://schemas.openxmlformats.org/presentationml/2006/main">
   <p:cSld>
     <p:spTree>
@@ -7512,13 +7631,20 @@
   <p:clrMapOvr>
     <a:masterClrMapping/>
   </p:clrMapOvr>
-  <p:transition xmlns:p14="http://schemas.microsoft.com/office/powerpoint/2010/main" spd="slow">
+  <p:transition spd="slow">
     <p:cut/>
   </p:transition>
+  <p:timing>
+    <p:tnLst>
+      <p:par>
+        <p:cTn id="1" dur="indefinite" restart="never" nodeType="tmRoot"/>
+      </p:par>
+    </p:tnLst>
+  </p:timing>
 </p:sld>
 </file>
 
-<file path=ppt/slides/slide14.xml><?xml version="1.0" encoding="utf-8"?>
+<file path=ppt/slides/slide15.xml><?xml version="1.0" encoding="utf-8"?>
 <p:sld xmlns:a="http://schemas.openxmlformats.org/drawingml/2006/main" xmlns:r="http://schemas.openxmlformats.org/officeDocument/2006/relationships" xmlns:p="http://schemas.openxmlformats.org/presentationml/2006/main">
   <p:cSld>
     <p:spTree>
@@ -7655,13 +7781,20 @@
   <p:clrMapOvr>
     <a:masterClrMapping/>
   </p:clrMapOvr>
-  <p:transition xmlns:p14="http://schemas.microsoft.com/office/powerpoint/2010/main" spd="slow">
+  <p:transition spd="slow">
     <p:cut/>
   </p:transition>
+  <p:timing>
+    <p:tnLst>
+      <p:par>
+        <p:cTn id="1" dur="indefinite" restart="never" nodeType="tmRoot"/>
+      </p:par>
+    </p:tnLst>
+  </p:timing>
 </p:sld>
 </file>
 
-<file path=ppt/slides/slide15.xml><?xml version="1.0" encoding="utf-8"?>
+<file path=ppt/slides/slide16.xml><?xml version="1.0" encoding="utf-8"?>
 <p:sld xmlns:a="http://schemas.openxmlformats.org/drawingml/2006/main" xmlns:r="http://schemas.openxmlformats.org/officeDocument/2006/relationships" xmlns:p="http://schemas.openxmlformats.org/presentationml/2006/main">
   <p:cSld>
     <p:spTree>
@@ -7724,7 +7857,7 @@
         </p:nvGraphicFramePr>
         <p:xfrm>
           <a:off x="3066675" y="1518750"/>
-          <a:ext cx="2819400" cy="2851911"/>
+          <a:ext cx="2819400" cy="2851912"/>
         </p:xfrm>
         <a:graphic>
           <a:graphicData uri="http://schemas.openxmlformats.org/drawingml/2006/table">
@@ -8642,13 +8775,20 @@
   <p:clrMapOvr>
     <a:masterClrMapping/>
   </p:clrMapOvr>
-  <p:transition xmlns:p14="http://schemas.microsoft.com/office/powerpoint/2010/main" spd="slow">
+  <p:transition spd="slow">
     <p:cut/>
   </p:transition>
+  <p:timing>
+    <p:tnLst>
+      <p:par>
+        <p:cTn id="1" dur="indefinite" restart="never" nodeType="tmRoot"/>
+      </p:par>
+    </p:tnLst>
+  </p:timing>
 </p:sld>
 </file>
 
-<file path=ppt/slides/slide16.xml><?xml version="1.0" encoding="utf-8"?>
+<file path=ppt/slides/slide17.xml><?xml version="1.0" encoding="utf-8"?>
 <p:sld xmlns:a="http://schemas.openxmlformats.org/drawingml/2006/main" xmlns:r="http://schemas.openxmlformats.org/officeDocument/2006/relationships" xmlns:p="http://schemas.openxmlformats.org/presentationml/2006/main">
   <p:cSld>
     <p:spTree>
@@ -8768,13 +8908,20 @@
   <p:clrMapOvr>
     <a:masterClrMapping/>
   </p:clrMapOvr>
-  <p:transition xmlns:p14="http://schemas.microsoft.com/office/powerpoint/2010/main" spd="slow">
+  <p:transition spd="slow">
     <p:cut/>
   </p:transition>
+  <p:timing>
+    <p:tnLst>
+      <p:par>
+        <p:cTn id="1" dur="indefinite" restart="never" nodeType="tmRoot"/>
+      </p:par>
+    </p:tnLst>
+  </p:timing>
 </p:sld>
 </file>
 
-<file path=ppt/slides/slide17.xml><?xml version="1.0" encoding="utf-8"?>
+<file path=ppt/slides/slide18.xml><?xml version="1.0" encoding="utf-8"?>
 <p:sld xmlns:a="http://schemas.openxmlformats.org/drawingml/2006/main" xmlns:r="http://schemas.openxmlformats.org/officeDocument/2006/relationships" xmlns:p="http://schemas.openxmlformats.org/presentationml/2006/main">
   <p:cSld>
     <p:spTree>
@@ -8928,13 +9075,20 @@
   <p:clrMapOvr>
     <a:masterClrMapping/>
   </p:clrMapOvr>
-  <p:transition xmlns:p14="http://schemas.microsoft.com/office/powerpoint/2010/main" spd="slow">
+  <p:transition spd="slow">
     <p:cut/>
   </p:transition>
+  <p:timing>
+    <p:tnLst>
+      <p:par>
+        <p:cTn id="1" dur="indefinite" restart="never" nodeType="tmRoot"/>
+      </p:par>
+    </p:tnLst>
+  </p:timing>
 </p:sld>
 </file>
 
-<file path=ppt/slides/slide18.xml><?xml version="1.0" encoding="utf-8"?>
+<file path=ppt/slides/slide19.xml><?xml version="1.0" encoding="utf-8"?>
 <p:sld xmlns:a="http://schemas.openxmlformats.org/drawingml/2006/main" xmlns:r="http://schemas.openxmlformats.org/officeDocument/2006/relationships" xmlns:p="http://schemas.openxmlformats.org/presentationml/2006/main">
   <p:cSld>
     <p:spTree>
@@ -9148,220 +9302,16 @@
   <p:clrMapOvr>
     <a:masterClrMapping/>
   </p:clrMapOvr>
-  <p:transition xmlns:p14="http://schemas.microsoft.com/office/powerpoint/2010/main" spd="slow">
+  <p:transition spd="slow">
     <p:cut/>
   </p:transition>
-</p:sld>
-</file>
-
-<file path=ppt/slides/slide19.xml><?xml version="1.0" encoding="utf-8"?>
-<p:sld xmlns:a="http://schemas.openxmlformats.org/drawingml/2006/main" xmlns:r="http://schemas.openxmlformats.org/officeDocument/2006/relationships" xmlns:p="http://schemas.openxmlformats.org/presentationml/2006/main">
-  <p:cSld>
-    <p:spTree>
-      <p:nvGrpSpPr>
-        <p:cNvPr id="1" name="Shape 137"/>
-        <p:cNvGrpSpPr/>
-        <p:nvPr/>
-      </p:nvGrpSpPr>
-      <p:grpSpPr>
-        <a:xfrm>
-          <a:off x="0" y="0"/>
-          <a:ext cx="0" cy="0"/>
-          <a:chOff x="0" y="0"/>
-          <a:chExt cx="0" cy="0"/>
-        </a:xfrm>
-      </p:grpSpPr>
-      <p:sp>
-        <p:nvSpPr>
-          <p:cNvPr id="138" name="Shape 138"/>
-          <p:cNvSpPr txBox="1">
-            <a:spLocks noGrp="1"/>
-          </p:cNvSpPr>
-          <p:nvPr>
-            <p:ph type="title"/>
-          </p:nvPr>
-        </p:nvSpPr>
-        <p:spPr>
-          <a:xfrm>
-            <a:off x="457200" y="205978"/>
-            <a:ext cx="8229600" cy="857400"/>
-          </a:xfrm>
-          <a:prstGeom prst="rect">
-            <a:avLst/>
-          </a:prstGeom>
-        </p:spPr>
-        <p:txBody>
-          <a:bodyPr lIns="91425" tIns="91425" rIns="91425" bIns="91425" anchor="b" anchorCtr="0">
-            <a:noAutofit/>
-          </a:bodyPr>
-          <a:lstStyle/>
-          <a:p>
-            <a:pPr algn="ctr">
-              <a:spcBef>
-                <a:spcPts val="0"/>
-              </a:spcBef>
-              <a:buNone/>
-            </a:pPr>
-            <a:r>
-              <a:rPr lang="en"/>
-              <a:t>Quality Management, cont.</a:t>
-            </a:r>
-          </a:p>
-        </p:txBody>
-      </p:sp>
-      <p:sp>
-        <p:nvSpPr>
-          <p:cNvPr id="139" name="Shape 139"/>
-          <p:cNvSpPr txBox="1">
-            <a:spLocks noGrp="1"/>
-          </p:cNvSpPr>
-          <p:nvPr>
-            <p:ph type="body" idx="1"/>
-          </p:nvPr>
-        </p:nvSpPr>
-        <p:spPr>
-          <a:xfrm>
-            <a:off x="521350" y="1200150"/>
-            <a:ext cx="8229600" cy="3725699"/>
-          </a:xfrm>
-          <a:prstGeom prst="rect">
-            <a:avLst/>
-          </a:prstGeom>
-        </p:spPr>
-        <p:txBody>
-          <a:bodyPr lIns="91425" tIns="91425" rIns="91425" bIns="91425" anchor="t" anchorCtr="0">
-            <a:noAutofit/>
-          </a:bodyPr>
-          <a:lstStyle/>
-          <a:p>
-            <a:pPr marL="457200" lvl="0" indent="-368300" rtl="0">
-              <a:spcBef>
-                <a:spcPts val="0"/>
-              </a:spcBef>
-              <a:buClr>
-                <a:schemeClr val="dk2"/>
-              </a:buClr>
-              <a:buSzPct val="100000"/>
-              <a:buFont typeface="Trebuchet MS"/>
-              <a:buChar char="●"/>
-            </a:pPr>
-            <a:r>
-              <a:rPr lang="en" sz="2200"/>
-              <a:t>Hardware</a:t>
-            </a:r>
-          </a:p>
-          <a:p>
-            <a:pPr marL="914400" lvl="1" indent="-368300" rtl="0">
-              <a:spcBef>
-                <a:spcPts val="0"/>
-              </a:spcBef>
-              <a:buClr>
-                <a:schemeClr val="dk2"/>
-              </a:buClr>
-              <a:buSzPct val="100000"/>
-              <a:buFont typeface="Trebuchet MS"/>
-              <a:buChar char="○"/>
-            </a:pPr>
-            <a:r>
-              <a:rPr lang="en" sz="2200"/>
-              <a:t>Will be evaluated by the entire team</a:t>
-            </a:r>
-          </a:p>
-          <a:p>
-            <a:pPr marL="914400" lvl="1" indent="-368300" rtl="0">
-              <a:spcBef>
-                <a:spcPts val="0"/>
-              </a:spcBef>
-              <a:buClr>
-                <a:schemeClr val="dk2"/>
-              </a:buClr>
-              <a:buSzPct val="100000"/>
-              <a:buFont typeface="Trebuchet MS"/>
-              <a:buChar char="○"/>
-            </a:pPr>
-            <a:r>
-              <a:rPr lang="en" sz="2200"/>
-              <a:t>Each piece of hardware will be assigned a weighted value by team</a:t>
-            </a:r>
-          </a:p>
-          <a:p>
-            <a:pPr marL="457200" lvl="0" indent="-368300" rtl="0">
-              <a:spcBef>
-                <a:spcPts val="0"/>
-              </a:spcBef>
-              <a:buClr>
-                <a:schemeClr val="dk2"/>
-              </a:buClr>
-              <a:buSzPct val="100000"/>
-              <a:buFont typeface="Trebuchet MS"/>
-              <a:buChar char="●"/>
-            </a:pPr>
-            <a:r>
-              <a:rPr lang="en" sz="2200"/>
-              <a:t>Testing</a:t>
-            </a:r>
-          </a:p>
-          <a:p>
-            <a:pPr marL="914400" lvl="1" indent="-368300" rtl="0">
-              <a:spcBef>
-                <a:spcPts val="0"/>
-              </a:spcBef>
-              <a:buClr>
-                <a:schemeClr val="dk2"/>
-              </a:buClr>
-              <a:buSzPct val="100000"/>
-              <a:buFont typeface="Trebuchet MS"/>
-              <a:buChar char="○"/>
-            </a:pPr>
-            <a:r>
-              <a:rPr lang="en" sz="2200"/>
-              <a:t>Software will be unit tested as it is being developed</a:t>
-            </a:r>
-          </a:p>
-          <a:p>
-            <a:pPr marL="914400" lvl="1" indent="-368300" rtl="0">
-              <a:spcBef>
-                <a:spcPts val="0"/>
-              </a:spcBef>
-              <a:buClr>
-                <a:schemeClr val="dk2"/>
-              </a:buClr>
-              <a:buSzPct val="100000"/>
-              <a:buFont typeface="Trebuchet MS"/>
-              <a:buChar char="○"/>
-            </a:pPr>
-            <a:r>
-              <a:rPr lang="en" sz="2200"/>
-              <a:t>Hardware will be tested before it is integrated with software</a:t>
-            </a:r>
-          </a:p>
-          <a:p>
-            <a:pPr marL="914400" lvl="1" indent="-368300">
-              <a:spcBef>
-                <a:spcPts val="0"/>
-              </a:spcBef>
-              <a:buClr>
-                <a:schemeClr val="dk2"/>
-              </a:buClr>
-              <a:buSzPct val="100000"/>
-              <a:buFont typeface="Trebuchet MS"/>
-              <a:buChar char="○"/>
-            </a:pPr>
-            <a:r>
-              <a:rPr lang="en" sz="2200"/>
-              <a:t>After individual testing, both software and hardware will be integrated and tested</a:t>
-            </a:r>
-          </a:p>
-        </p:txBody>
-      </p:sp>
-    </p:spTree>
-  </p:cSld>
-  <p:clrMapOvr>
-    <a:masterClrMapping/>
-  </p:clrMapOvr>
-  <p:transition xmlns:p14="http://schemas.microsoft.com/office/powerpoint/2010/main" spd="slow">
-    <p:cut/>
-  </p:transition>
+  <p:timing>
+    <p:tnLst>
+      <p:par>
+        <p:cTn id="1" dur="indefinite" restart="never" nodeType="tmRoot"/>
+      </p:par>
+    </p:tnLst>
+  </p:timing>
 </p:sld>
 </file>
 
@@ -9494,13 +9444,238 @@
   <p:clrMapOvr>
     <a:masterClrMapping/>
   </p:clrMapOvr>
-  <p:transition xmlns:p14="http://schemas.microsoft.com/office/powerpoint/2010/main" spd="slow">
+  <p:transition spd="slow">
     <p:cut/>
   </p:transition>
+  <p:timing>
+    <p:tnLst>
+      <p:par>
+        <p:cTn id="1" dur="indefinite" restart="never" nodeType="tmRoot"/>
+      </p:par>
+    </p:tnLst>
+  </p:timing>
 </p:sld>
 </file>
 
 <file path=ppt/slides/slide20.xml><?xml version="1.0" encoding="utf-8"?>
+<p:sld xmlns:a="http://schemas.openxmlformats.org/drawingml/2006/main" xmlns:r="http://schemas.openxmlformats.org/officeDocument/2006/relationships" xmlns:p="http://schemas.openxmlformats.org/presentationml/2006/main">
+  <p:cSld>
+    <p:spTree>
+      <p:nvGrpSpPr>
+        <p:cNvPr id="1" name="Shape 137"/>
+        <p:cNvGrpSpPr/>
+        <p:nvPr/>
+      </p:nvGrpSpPr>
+      <p:grpSpPr>
+        <a:xfrm>
+          <a:off x="0" y="0"/>
+          <a:ext cx="0" cy="0"/>
+          <a:chOff x="0" y="0"/>
+          <a:chExt cx="0" cy="0"/>
+        </a:xfrm>
+      </p:grpSpPr>
+      <p:sp>
+        <p:nvSpPr>
+          <p:cNvPr id="138" name="Shape 138"/>
+          <p:cNvSpPr txBox="1">
+            <a:spLocks noGrp="1"/>
+          </p:cNvSpPr>
+          <p:nvPr>
+            <p:ph type="title"/>
+          </p:nvPr>
+        </p:nvSpPr>
+        <p:spPr>
+          <a:xfrm>
+            <a:off x="457200" y="205978"/>
+            <a:ext cx="8229600" cy="857400"/>
+          </a:xfrm>
+          <a:prstGeom prst="rect">
+            <a:avLst/>
+          </a:prstGeom>
+        </p:spPr>
+        <p:txBody>
+          <a:bodyPr lIns="91425" tIns="91425" rIns="91425" bIns="91425" anchor="b" anchorCtr="0">
+            <a:noAutofit/>
+          </a:bodyPr>
+          <a:lstStyle/>
+          <a:p>
+            <a:pPr algn="ctr">
+              <a:spcBef>
+                <a:spcPts val="0"/>
+              </a:spcBef>
+              <a:buNone/>
+            </a:pPr>
+            <a:r>
+              <a:rPr lang="en"/>
+              <a:t>Quality Management, cont.</a:t>
+            </a:r>
+          </a:p>
+        </p:txBody>
+      </p:sp>
+      <p:sp>
+        <p:nvSpPr>
+          <p:cNvPr id="139" name="Shape 139"/>
+          <p:cNvSpPr txBox="1">
+            <a:spLocks noGrp="1"/>
+          </p:cNvSpPr>
+          <p:nvPr>
+            <p:ph type="body" idx="1"/>
+          </p:nvPr>
+        </p:nvSpPr>
+        <p:spPr>
+          <a:xfrm>
+            <a:off x="521350" y="1200150"/>
+            <a:ext cx="8229600" cy="3725699"/>
+          </a:xfrm>
+          <a:prstGeom prst="rect">
+            <a:avLst/>
+          </a:prstGeom>
+        </p:spPr>
+        <p:txBody>
+          <a:bodyPr lIns="91425" tIns="91425" rIns="91425" bIns="91425" anchor="t" anchorCtr="0">
+            <a:noAutofit/>
+          </a:bodyPr>
+          <a:lstStyle/>
+          <a:p>
+            <a:pPr marL="457200" lvl="0" indent="-368300" rtl="0">
+              <a:spcBef>
+                <a:spcPts val="0"/>
+              </a:spcBef>
+              <a:buClr>
+                <a:schemeClr val="dk2"/>
+              </a:buClr>
+              <a:buSzPct val="100000"/>
+              <a:buFont typeface="Trebuchet MS"/>
+              <a:buChar char="●"/>
+            </a:pPr>
+            <a:r>
+              <a:rPr lang="en" sz="2200"/>
+              <a:t>Hardware</a:t>
+            </a:r>
+          </a:p>
+          <a:p>
+            <a:pPr marL="914400" lvl="1" indent="-368300" rtl="0">
+              <a:spcBef>
+                <a:spcPts val="0"/>
+              </a:spcBef>
+              <a:buClr>
+                <a:schemeClr val="dk2"/>
+              </a:buClr>
+              <a:buSzPct val="100000"/>
+              <a:buFont typeface="Trebuchet MS"/>
+              <a:buChar char="○"/>
+            </a:pPr>
+            <a:r>
+              <a:rPr lang="en" sz="2200"/>
+              <a:t>Will be evaluated by the entire team</a:t>
+            </a:r>
+          </a:p>
+          <a:p>
+            <a:pPr marL="914400" lvl="1" indent="-368300" rtl="0">
+              <a:spcBef>
+                <a:spcPts val="0"/>
+              </a:spcBef>
+              <a:buClr>
+                <a:schemeClr val="dk2"/>
+              </a:buClr>
+              <a:buSzPct val="100000"/>
+              <a:buFont typeface="Trebuchet MS"/>
+              <a:buChar char="○"/>
+            </a:pPr>
+            <a:r>
+              <a:rPr lang="en" sz="2200"/>
+              <a:t>Each piece of hardware will be assigned a weighted value by team</a:t>
+            </a:r>
+          </a:p>
+          <a:p>
+            <a:pPr marL="457200" lvl="0" indent="-368300" rtl="0">
+              <a:spcBef>
+                <a:spcPts val="0"/>
+              </a:spcBef>
+              <a:buClr>
+                <a:schemeClr val="dk2"/>
+              </a:buClr>
+              <a:buSzPct val="100000"/>
+              <a:buFont typeface="Trebuchet MS"/>
+              <a:buChar char="●"/>
+            </a:pPr>
+            <a:r>
+              <a:rPr lang="en" sz="2200"/>
+              <a:t>Testing</a:t>
+            </a:r>
+          </a:p>
+          <a:p>
+            <a:pPr marL="914400" lvl="1" indent="-368300" rtl="0">
+              <a:spcBef>
+                <a:spcPts val="0"/>
+              </a:spcBef>
+              <a:buClr>
+                <a:schemeClr val="dk2"/>
+              </a:buClr>
+              <a:buSzPct val="100000"/>
+              <a:buFont typeface="Trebuchet MS"/>
+              <a:buChar char="○"/>
+            </a:pPr>
+            <a:r>
+              <a:rPr lang="en" sz="2200"/>
+              <a:t>Software will be unit tested as it is being developed</a:t>
+            </a:r>
+          </a:p>
+          <a:p>
+            <a:pPr marL="914400" lvl="1" indent="-368300" rtl="0">
+              <a:spcBef>
+                <a:spcPts val="0"/>
+              </a:spcBef>
+              <a:buClr>
+                <a:schemeClr val="dk2"/>
+              </a:buClr>
+              <a:buSzPct val="100000"/>
+              <a:buFont typeface="Trebuchet MS"/>
+              <a:buChar char="○"/>
+            </a:pPr>
+            <a:r>
+              <a:rPr lang="en" sz="2200"/>
+              <a:t>Hardware will be tested before it is integrated with software</a:t>
+            </a:r>
+          </a:p>
+          <a:p>
+            <a:pPr marL="914400" lvl="1" indent="-368300">
+              <a:spcBef>
+                <a:spcPts val="0"/>
+              </a:spcBef>
+              <a:buClr>
+                <a:schemeClr val="dk2"/>
+              </a:buClr>
+              <a:buSzPct val="100000"/>
+              <a:buFont typeface="Trebuchet MS"/>
+              <a:buChar char="○"/>
+            </a:pPr>
+            <a:r>
+              <a:rPr lang="en" sz="2200"/>
+              <a:t>After individual testing, both software and hardware will be integrated and tested</a:t>
+            </a:r>
+          </a:p>
+        </p:txBody>
+      </p:sp>
+    </p:spTree>
+  </p:cSld>
+  <p:clrMapOvr>
+    <a:masterClrMapping/>
+  </p:clrMapOvr>
+  <p:transition spd="slow">
+    <p:cut/>
+  </p:transition>
+  <p:timing>
+    <p:tnLst>
+      <p:par>
+        <p:cTn id="1" dur="indefinite" restart="never" nodeType="tmRoot"/>
+      </p:par>
+    </p:tnLst>
+  </p:timing>
+</p:sld>
+</file>
+
+<file path=ppt/slides/slide21.xml><?xml version="1.0" encoding="utf-8"?>
 <p:sld xmlns:a="http://schemas.openxmlformats.org/drawingml/2006/main" xmlns:r="http://schemas.openxmlformats.org/officeDocument/2006/relationships" xmlns:p="http://schemas.openxmlformats.org/presentationml/2006/main">
   <p:cSld>
     <p:spTree>
@@ -9793,13 +9968,20 @@
   <p:clrMapOvr>
     <a:masterClrMapping/>
   </p:clrMapOvr>
-  <p:transition xmlns:p14="http://schemas.microsoft.com/office/powerpoint/2010/main" spd="slow">
+  <p:transition spd="slow">
     <p:cut/>
   </p:transition>
+  <p:timing>
+    <p:tnLst>
+      <p:par>
+        <p:cTn id="1" dur="indefinite" restart="never" nodeType="tmRoot"/>
+      </p:par>
+    </p:tnLst>
+  </p:timing>
 </p:sld>
 </file>
 
-<file path=ppt/slides/slide21.xml><?xml version="1.0" encoding="utf-8"?>
+<file path=ppt/slides/slide22.xml><?xml version="1.0" encoding="utf-8"?>
 <p:sld xmlns:a="http://schemas.openxmlformats.org/drawingml/2006/main" xmlns:r="http://schemas.openxmlformats.org/officeDocument/2006/relationships" xmlns:p="http://schemas.openxmlformats.org/presentationml/2006/main">
   <p:cSld>
     <p:spTree>
@@ -10021,13 +10203,20 @@
   <p:clrMapOvr>
     <a:masterClrMapping/>
   </p:clrMapOvr>
-  <p:transition xmlns:p14="http://schemas.microsoft.com/office/powerpoint/2010/main" spd="slow">
+  <p:transition spd="slow">
     <p:cut/>
   </p:transition>
+  <p:timing>
+    <p:tnLst>
+      <p:par>
+        <p:cTn id="1" dur="indefinite" restart="never" nodeType="tmRoot"/>
+      </p:par>
+    </p:tnLst>
+  </p:timing>
 </p:sld>
 </file>
 
-<file path=ppt/slides/slide22.xml><?xml version="1.0" encoding="utf-8"?>
+<file path=ppt/slides/slide23.xml><?xml version="1.0" encoding="utf-8"?>
 <p:sld xmlns:a="http://schemas.openxmlformats.org/drawingml/2006/main" xmlns:r="http://schemas.openxmlformats.org/officeDocument/2006/relationships" xmlns:p="http://schemas.openxmlformats.org/presentationml/2006/main">
   <p:cSld>
     <p:spTree>
@@ -10232,13 +10421,20 @@
   <p:clrMapOvr>
     <a:masterClrMapping/>
   </p:clrMapOvr>
-  <p:transition xmlns:p14="http://schemas.microsoft.com/office/powerpoint/2010/main" spd="slow">
+  <p:transition spd="slow">
     <p:cut/>
   </p:transition>
+  <p:timing>
+    <p:tnLst>
+      <p:par>
+        <p:cTn id="1" dur="indefinite" restart="never" nodeType="tmRoot"/>
+      </p:par>
+    </p:tnLst>
+  </p:timing>
 </p:sld>
 </file>
 
-<file path=ppt/slides/slide23.xml><?xml version="1.0" encoding="utf-8"?>
+<file path=ppt/slides/slide24.xml><?xml version="1.0" encoding="utf-8"?>
 <p:sld xmlns:a="http://schemas.openxmlformats.org/drawingml/2006/main" xmlns:r="http://schemas.openxmlformats.org/officeDocument/2006/relationships" xmlns:p="http://schemas.openxmlformats.org/presentationml/2006/main">
   <p:cSld>
     <p:spTree>
@@ -10409,13 +10605,20 @@
   <p:clrMapOvr>
     <a:masterClrMapping/>
   </p:clrMapOvr>
-  <p:transition xmlns:p14="http://schemas.microsoft.com/office/powerpoint/2010/main" spd="slow">
+  <p:transition spd="slow">
     <p:cut/>
   </p:transition>
+  <p:timing>
+    <p:tnLst>
+      <p:par>
+        <p:cTn id="1" dur="indefinite" restart="never" nodeType="tmRoot"/>
+      </p:par>
+    </p:tnLst>
+  </p:timing>
 </p:sld>
 </file>
 
-<file path=ppt/slides/slide24.xml><?xml version="1.0" encoding="utf-8"?>
+<file path=ppt/slides/slide25.xml><?xml version="1.0" encoding="utf-8"?>
 <p:sld xmlns:a="http://schemas.openxmlformats.org/drawingml/2006/main" xmlns:r="http://schemas.openxmlformats.org/officeDocument/2006/relationships" xmlns:p="http://schemas.openxmlformats.org/presentationml/2006/main">
   <p:cSld>
     <p:spTree>
@@ -10603,13 +10806,20 @@
   <p:clrMapOvr>
     <a:masterClrMapping/>
   </p:clrMapOvr>
-  <p:transition xmlns:p14="http://schemas.microsoft.com/office/powerpoint/2010/main" spd="slow">
+  <p:transition spd="slow">
     <p:cut/>
   </p:transition>
+  <p:timing>
+    <p:tnLst>
+      <p:par>
+        <p:cTn id="1" dur="indefinite" restart="never" nodeType="tmRoot"/>
+      </p:par>
+    </p:tnLst>
+  </p:timing>
 </p:sld>
 </file>
 
-<file path=ppt/slides/slide25.xml><?xml version="1.0" encoding="utf-8"?>
+<file path=ppt/slides/slide26.xml><?xml version="1.0" encoding="utf-8"?>
 <p:sld xmlns:a="http://schemas.openxmlformats.org/drawingml/2006/main" xmlns:r="http://schemas.openxmlformats.org/officeDocument/2006/relationships" xmlns:p="http://schemas.openxmlformats.org/presentationml/2006/main">
   <p:cSld>
     <p:spTree>
@@ -10814,13 +11024,20 @@
   <p:clrMapOvr>
     <a:masterClrMapping/>
   </p:clrMapOvr>
-  <p:transition xmlns:p14="http://schemas.microsoft.com/office/powerpoint/2010/main" spd="slow">
+  <p:transition spd="slow">
     <p:cut/>
   </p:transition>
+  <p:timing>
+    <p:tnLst>
+      <p:par>
+        <p:cTn id="1" dur="indefinite" restart="never" nodeType="tmRoot"/>
+      </p:par>
+    </p:tnLst>
+  </p:timing>
 </p:sld>
 </file>
 
-<file path=ppt/slides/slide26.xml><?xml version="1.0" encoding="utf-8"?>
+<file path=ppt/slides/slide27.xml><?xml version="1.0" encoding="utf-8"?>
 <p:sld xmlns:a="http://schemas.openxmlformats.org/drawingml/2006/main" xmlns:r="http://schemas.openxmlformats.org/officeDocument/2006/relationships" xmlns:p="http://schemas.openxmlformats.org/presentationml/2006/main">
   <p:cSld>
     <p:spTree>
@@ -10883,7 +11100,7 @@
         </p:nvGraphicFramePr>
         <p:xfrm>
           <a:off x="1700212" y="1032750"/>
-          <a:ext cx="5743575" cy="4375925"/>
+          <a:ext cx="5743575" cy="4375926"/>
         </p:xfrm>
         <a:graphic>
           <a:graphicData uri="http://schemas.openxmlformats.org/drawingml/2006/table">
@@ -12748,13 +12965,20 @@
   <p:clrMapOvr>
     <a:masterClrMapping/>
   </p:clrMapOvr>
-  <p:transition xmlns:p14="http://schemas.microsoft.com/office/powerpoint/2010/main" spd="slow">
+  <p:transition spd="slow">
     <p:cut/>
   </p:transition>
+  <p:timing>
+    <p:tnLst>
+      <p:par>
+        <p:cTn id="1" dur="indefinite" restart="never" nodeType="tmRoot"/>
+      </p:par>
+    </p:tnLst>
+  </p:timing>
 </p:sld>
 </file>
 
-<file path=ppt/slides/slide27.xml><?xml version="1.0" encoding="utf-8"?>
+<file path=ppt/slides/slide28.xml><?xml version="1.0" encoding="utf-8"?>
 <p:sld xmlns:a="http://schemas.openxmlformats.org/drawingml/2006/main" xmlns:r="http://schemas.openxmlformats.org/officeDocument/2006/relationships" xmlns:p="http://schemas.openxmlformats.org/presentationml/2006/main">
   <p:cSld>
     <p:spTree>
@@ -12908,13 +13132,20 @@
   <p:clrMapOvr>
     <a:masterClrMapping/>
   </p:clrMapOvr>
-  <p:transition xmlns:p14="http://schemas.microsoft.com/office/powerpoint/2010/main" spd="slow">
+  <p:transition spd="slow">
     <p:cut/>
   </p:transition>
+  <p:timing>
+    <p:tnLst>
+      <p:par>
+        <p:cTn id="1" dur="indefinite" restart="never" nodeType="tmRoot"/>
+      </p:par>
+    </p:tnLst>
+  </p:timing>
 </p:sld>
 </file>
 
-<file path=ppt/slides/slide28.xml><?xml version="1.0" encoding="utf-8"?>
+<file path=ppt/slides/slide29.xml><?xml version="1.0" encoding="utf-8"?>
 <p:sld xmlns:a="http://schemas.openxmlformats.org/drawingml/2006/main" xmlns:r="http://schemas.openxmlformats.org/officeDocument/2006/relationships" xmlns:p="http://schemas.openxmlformats.org/presentationml/2006/main">
   <p:cSld>
     <p:spTree>
@@ -13051,186 +13282,16 @@
   <p:clrMapOvr>
     <a:masterClrMapping/>
   </p:clrMapOvr>
-  <p:transition xmlns:p14="http://schemas.microsoft.com/office/powerpoint/2010/main" spd="slow">
+  <p:transition spd="slow">
     <p:cut/>
   </p:transition>
-</p:sld>
-</file>
-
-<file path=ppt/slides/slide29.xml><?xml version="1.0" encoding="utf-8"?>
-<p:sld xmlns:a="http://schemas.openxmlformats.org/drawingml/2006/main" xmlns:r="http://schemas.openxmlformats.org/officeDocument/2006/relationships" xmlns:p="http://schemas.openxmlformats.org/presentationml/2006/main">
-  <p:cSld>
-    <p:spTree>
-      <p:nvGrpSpPr>
-        <p:cNvPr id="1" name="Shape 198"/>
-        <p:cNvGrpSpPr/>
-        <p:nvPr/>
-      </p:nvGrpSpPr>
-      <p:grpSpPr>
-        <a:xfrm>
-          <a:off x="0" y="0"/>
-          <a:ext cx="0" cy="0"/>
-          <a:chOff x="0" y="0"/>
-          <a:chExt cx="0" cy="0"/>
-        </a:xfrm>
-      </p:grpSpPr>
-      <p:sp>
-        <p:nvSpPr>
-          <p:cNvPr id="199" name="Shape 199"/>
-          <p:cNvSpPr txBox="1">
-            <a:spLocks noGrp="1"/>
-          </p:cNvSpPr>
-          <p:nvPr>
-            <p:ph type="title"/>
-          </p:nvPr>
-        </p:nvSpPr>
-        <p:spPr>
-          <a:xfrm>
-            <a:off x="457200" y="205978"/>
-            <a:ext cx="8229600" cy="857400"/>
-          </a:xfrm>
-          <a:prstGeom prst="rect">
-            <a:avLst/>
-          </a:prstGeom>
-        </p:spPr>
-        <p:txBody>
-          <a:bodyPr lIns="91425" tIns="91425" rIns="91425" bIns="91425" anchor="b" anchorCtr="0">
-            <a:noAutofit/>
-          </a:bodyPr>
-          <a:lstStyle/>
-          <a:p>
-            <a:pPr algn="ctr">
-              <a:spcBef>
-                <a:spcPts val="0"/>
-              </a:spcBef>
-              <a:buNone/>
-            </a:pPr>
-            <a:r>
-              <a:rPr lang="en"/>
-              <a:t>Procurement Management</a:t>
-            </a:r>
-          </a:p>
-        </p:txBody>
-      </p:sp>
-      <p:sp>
-        <p:nvSpPr>
-          <p:cNvPr id="200" name="Shape 200"/>
-          <p:cNvSpPr txBox="1">
-            <a:spLocks noGrp="1"/>
-          </p:cNvSpPr>
-          <p:nvPr>
-            <p:ph type="body" idx="1"/>
-          </p:nvPr>
-        </p:nvSpPr>
-        <p:spPr>
-          <a:xfrm>
-            <a:off x="457200" y="1200150"/>
-            <a:ext cx="8229600" cy="3725699"/>
-          </a:xfrm>
-          <a:prstGeom prst="rect">
-            <a:avLst/>
-          </a:prstGeom>
-        </p:spPr>
-        <p:txBody>
-          <a:bodyPr lIns="91425" tIns="91425" rIns="91425" bIns="91425" anchor="t" anchorCtr="0">
-            <a:noAutofit/>
-          </a:bodyPr>
-          <a:lstStyle/>
-          <a:p>
-            <a:pPr marL="457200" lvl="0" indent="-419100" rtl="0">
-              <a:spcBef>
-                <a:spcPts val="0"/>
-              </a:spcBef>
-              <a:buClr>
-                <a:schemeClr val="dk2"/>
-              </a:buClr>
-              <a:buSzPct val="100000"/>
-              <a:buFont typeface="Arial"/>
-              <a:buChar char="●"/>
-            </a:pPr>
-            <a:r>
-              <a:rPr lang="en"/>
-              <a:t>Roles &amp; Responsibility</a:t>
-            </a:r>
-          </a:p>
-          <a:p>
-            <a:pPr marL="914400" lvl="1" indent="-381000" rtl="0">
-              <a:spcBef>
-                <a:spcPts val="0"/>
-              </a:spcBef>
-              <a:buClr>
-                <a:schemeClr val="dk2"/>
-              </a:buClr>
-              <a:buSzPct val="80000"/>
-              <a:buFont typeface="Courier New"/>
-              <a:buChar char="o"/>
-            </a:pPr>
-            <a:r>
-              <a:rPr lang="en"/>
-              <a:t>Project Sponsor</a:t>
-            </a:r>
-          </a:p>
-          <a:p>
-            <a:pPr marL="1371600" lvl="2" indent="-381000" rtl="0">
-              <a:spcBef>
-                <a:spcPts val="0"/>
-              </a:spcBef>
-              <a:buClr>
-                <a:schemeClr val="dk2"/>
-              </a:buClr>
-              <a:buSzPct val="80000"/>
-              <a:buFont typeface="Wingdings"/>
-              <a:buChar char="§"/>
-            </a:pPr>
-            <a:r>
-              <a:rPr lang="en"/>
-              <a:t>Provide suggestions/advice concerning components and services needed</a:t>
-            </a:r>
-          </a:p>
-          <a:p>
-            <a:pPr marL="914400" lvl="1" indent="-381000" rtl="0">
-              <a:spcBef>
-                <a:spcPts val="0"/>
-              </a:spcBef>
-              <a:buClr>
-                <a:schemeClr val="dk2"/>
-              </a:buClr>
-              <a:buSzPct val="80000"/>
-              <a:buFont typeface="Trebuchet MS"/>
-              <a:buChar char="○"/>
-            </a:pPr>
-            <a:r>
-              <a:rPr lang="en"/>
-              <a:t>Project Manager</a:t>
-            </a:r>
-          </a:p>
-          <a:p>
-            <a:pPr marL="1371600" lvl="2" indent="-381000">
-              <a:spcBef>
-                <a:spcPts val="0"/>
-              </a:spcBef>
-              <a:buClr>
-                <a:schemeClr val="dk2"/>
-              </a:buClr>
-              <a:buSzPct val="80000"/>
-              <a:buFont typeface="Trebuchet MS"/>
-              <a:buChar char="■"/>
-            </a:pPr>
-            <a:r>
-              <a:rPr lang="en"/>
-              <a:t>Will make final decision on which components and services will be purchased</a:t>
-            </a:r>
-          </a:p>
-        </p:txBody>
-      </p:sp>
-    </p:spTree>
-  </p:cSld>
-  <p:clrMapOvr>
-    <a:masterClrMapping/>
-  </p:clrMapOvr>
-  <p:transition xmlns:p14="http://schemas.microsoft.com/office/powerpoint/2010/main" spd="slow">
-    <p:cut/>
-  </p:transition>
+  <p:timing>
+    <p:tnLst>
+      <p:par>
+        <p:cTn id="1" dur="indefinite" restart="never" nodeType="tmRoot"/>
+      </p:par>
+    </p:tnLst>
+  </p:timing>
 </p:sld>
 </file>
 
@@ -13326,8 +13387,8 @@
               <a:buChar char="●"/>
             </a:pPr>
             <a:r>
-              <a:rPr lang="en"/>
-              <a:t>Overview of the project plan</a:t>
+              <a:rPr lang="en" dirty="0" smtClean="0"/>
+              <a:t>Task Breakdown &amp; Estimation</a:t>
             </a:r>
           </a:p>
           <a:p>
@@ -13343,12 +13404,12 @@
               <a:buChar char="●"/>
             </a:pPr>
             <a:r>
-              <a:rPr lang="en"/>
-              <a:t>Task estimation</a:t>
-            </a:r>
-          </a:p>
-          <a:p>
-            <a:pPr marL="457200" lvl="0" indent="-419100">
+              <a:rPr lang="en" dirty="0" smtClean="0"/>
+              <a:t>Keeping Track of Progress</a:t>
+            </a:r>
+          </a:p>
+          <a:p>
+            <a:pPr marL="457200" lvl="0" indent="-419100" rtl="0">
               <a:spcBef>
                 <a:spcPts val="0"/>
               </a:spcBef>
@@ -13360,9 +13421,27 @@
               <a:buChar char="●"/>
             </a:pPr>
             <a:r>
-              <a:rPr lang="en"/>
-              <a:t>Updates to plan</a:t>
-            </a:r>
+              <a:rPr lang="en" dirty="0" smtClean="0"/>
+              <a:t>Overview of the Project Plan</a:t>
+            </a:r>
+          </a:p>
+          <a:p>
+            <a:pPr marL="457200" lvl="0" indent="-419100" rtl="0">
+              <a:spcBef>
+                <a:spcPts val="0"/>
+              </a:spcBef>
+              <a:buClr>
+                <a:schemeClr val="dk2"/>
+              </a:buClr>
+              <a:buSzPct val="100000"/>
+              <a:buFont typeface="Arial"/>
+              <a:buChar char="●"/>
+            </a:pPr>
+            <a:r>
+              <a:rPr lang="en" dirty="0" smtClean="0"/>
+              <a:t>Updates to the Project Plan</a:t>
+            </a:r>
+            <a:endParaRPr lang="en" dirty="0"/>
           </a:p>
         </p:txBody>
       </p:sp>
@@ -13371,13 +13450,204 @@
   <p:clrMapOvr>
     <a:masterClrMapping/>
   </p:clrMapOvr>
-  <p:transition xmlns:p14="http://schemas.microsoft.com/office/powerpoint/2010/main" spd="slow">
+  <p:transition spd="slow">
     <p:cut/>
   </p:transition>
+  <p:timing>
+    <p:tnLst>
+      <p:par>
+        <p:cTn id="1" dur="indefinite" restart="never" nodeType="tmRoot"/>
+      </p:par>
+    </p:tnLst>
+  </p:timing>
 </p:sld>
 </file>
 
 <file path=ppt/slides/slide30.xml><?xml version="1.0" encoding="utf-8"?>
+<p:sld xmlns:a="http://schemas.openxmlformats.org/drawingml/2006/main" xmlns:r="http://schemas.openxmlformats.org/officeDocument/2006/relationships" xmlns:p="http://schemas.openxmlformats.org/presentationml/2006/main">
+  <p:cSld>
+    <p:spTree>
+      <p:nvGrpSpPr>
+        <p:cNvPr id="1" name="Shape 198"/>
+        <p:cNvGrpSpPr/>
+        <p:nvPr/>
+      </p:nvGrpSpPr>
+      <p:grpSpPr>
+        <a:xfrm>
+          <a:off x="0" y="0"/>
+          <a:ext cx="0" cy="0"/>
+          <a:chOff x="0" y="0"/>
+          <a:chExt cx="0" cy="0"/>
+        </a:xfrm>
+      </p:grpSpPr>
+      <p:sp>
+        <p:nvSpPr>
+          <p:cNvPr id="199" name="Shape 199"/>
+          <p:cNvSpPr txBox="1">
+            <a:spLocks noGrp="1"/>
+          </p:cNvSpPr>
+          <p:nvPr>
+            <p:ph type="title"/>
+          </p:nvPr>
+        </p:nvSpPr>
+        <p:spPr>
+          <a:xfrm>
+            <a:off x="457200" y="205978"/>
+            <a:ext cx="8229600" cy="857400"/>
+          </a:xfrm>
+          <a:prstGeom prst="rect">
+            <a:avLst/>
+          </a:prstGeom>
+        </p:spPr>
+        <p:txBody>
+          <a:bodyPr lIns="91425" tIns="91425" rIns="91425" bIns="91425" anchor="b" anchorCtr="0">
+            <a:noAutofit/>
+          </a:bodyPr>
+          <a:lstStyle/>
+          <a:p>
+            <a:pPr algn="ctr">
+              <a:spcBef>
+                <a:spcPts val="0"/>
+              </a:spcBef>
+              <a:buNone/>
+            </a:pPr>
+            <a:r>
+              <a:rPr lang="en"/>
+              <a:t>Procurement Management</a:t>
+            </a:r>
+          </a:p>
+        </p:txBody>
+      </p:sp>
+      <p:sp>
+        <p:nvSpPr>
+          <p:cNvPr id="200" name="Shape 200"/>
+          <p:cNvSpPr txBox="1">
+            <a:spLocks noGrp="1"/>
+          </p:cNvSpPr>
+          <p:nvPr>
+            <p:ph type="body" idx="1"/>
+          </p:nvPr>
+        </p:nvSpPr>
+        <p:spPr>
+          <a:xfrm>
+            <a:off x="457200" y="1200150"/>
+            <a:ext cx="8229600" cy="3725699"/>
+          </a:xfrm>
+          <a:prstGeom prst="rect">
+            <a:avLst/>
+          </a:prstGeom>
+        </p:spPr>
+        <p:txBody>
+          <a:bodyPr lIns="91425" tIns="91425" rIns="91425" bIns="91425" anchor="t" anchorCtr="0">
+            <a:noAutofit/>
+          </a:bodyPr>
+          <a:lstStyle/>
+          <a:p>
+            <a:pPr marL="457200" lvl="0" indent="-419100" rtl="0">
+              <a:spcBef>
+                <a:spcPts val="0"/>
+              </a:spcBef>
+              <a:buClr>
+                <a:schemeClr val="dk2"/>
+              </a:buClr>
+              <a:buSzPct val="100000"/>
+              <a:buFont typeface="Arial"/>
+              <a:buChar char="●"/>
+            </a:pPr>
+            <a:r>
+              <a:rPr lang="en"/>
+              <a:t>Roles &amp; Responsibility</a:t>
+            </a:r>
+          </a:p>
+          <a:p>
+            <a:pPr marL="914400" lvl="1" indent="-381000" rtl="0">
+              <a:spcBef>
+                <a:spcPts val="0"/>
+              </a:spcBef>
+              <a:buClr>
+                <a:schemeClr val="dk2"/>
+              </a:buClr>
+              <a:buSzPct val="80000"/>
+              <a:buFont typeface="Courier New"/>
+              <a:buChar char="o"/>
+            </a:pPr>
+            <a:r>
+              <a:rPr lang="en"/>
+              <a:t>Project Sponsor</a:t>
+            </a:r>
+          </a:p>
+          <a:p>
+            <a:pPr marL="1371600" lvl="2" indent="-381000" rtl="0">
+              <a:spcBef>
+                <a:spcPts val="0"/>
+              </a:spcBef>
+              <a:buClr>
+                <a:schemeClr val="dk2"/>
+              </a:buClr>
+              <a:buSzPct val="80000"/>
+              <a:buFont typeface="Wingdings"/>
+              <a:buChar char="§"/>
+            </a:pPr>
+            <a:r>
+              <a:rPr lang="en"/>
+              <a:t>Provide suggestions/advice concerning components and services needed</a:t>
+            </a:r>
+          </a:p>
+          <a:p>
+            <a:pPr marL="914400" lvl="1" indent="-381000" rtl="0">
+              <a:spcBef>
+                <a:spcPts val="0"/>
+              </a:spcBef>
+              <a:buClr>
+                <a:schemeClr val="dk2"/>
+              </a:buClr>
+              <a:buSzPct val="80000"/>
+              <a:buFont typeface="Trebuchet MS"/>
+              <a:buChar char="○"/>
+            </a:pPr>
+            <a:r>
+              <a:rPr lang="en"/>
+              <a:t>Project Manager</a:t>
+            </a:r>
+          </a:p>
+          <a:p>
+            <a:pPr marL="1371600" lvl="2" indent="-381000">
+              <a:spcBef>
+                <a:spcPts val="0"/>
+              </a:spcBef>
+              <a:buClr>
+                <a:schemeClr val="dk2"/>
+              </a:buClr>
+              <a:buSzPct val="80000"/>
+              <a:buFont typeface="Trebuchet MS"/>
+              <a:buChar char="■"/>
+            </a:pPr>
+            <a:r>
+              <a:rPr lang="en"/>
+              <a:t>Will make final decision on which components and services will be purchased</a:t>
+            </a:r>
+          </a:p>
+        </p:txBody>
+      </p:sp>
+    </p:spTree>
+  </p:cSld>
+  <p:clrMapOvr>
+    <a:masterClrMapping/>
+  </p:clrMapOvr>
+  <p:transition spd="slow">
+    <p:cut/>
+  </p:transition>
+  <p:timing>
+    <p:tnLst>
+      <p:par>
+        <p:cTn id="1" dur="indefinite" restart="never" nodeType="tmRoot"/>
+      </p:par>
+    </p:tnLst>
+  </p:timing>
+</p:sld>
+</file>
+
+<file path=ppt/slides/slide31.xml><?xml version="1.0" encoding="utf-8"?>
 <p:sld xmlns:a="http://schemas.openxmlformats.org/drawingml/2006/main" xmlns:r="http://schemas.openxmlformats.org/officeDocument/2006/relationships" xmlns:p="http://schemas.openxmlformats.org/presentationml/2006/main">
   <p:cSld>
     <p:spTree>
@@ -13548,13 +13818,20 @@
   <p:clrMapOvr>
     <a:masterClrMapping/>
   </p:clrMapOvr>
-  <p:transition xmlns:p14="http://schemas.microsoft.com/office/powerpoint/2010/main" spd="slow">
+  <p:transition spd="slow">
     <p:cut/>
   </p:transition>
+  <p:timing>
+    <p:tnLst>
+      <p:par>
+        <p:cTn id="1" dur="indefinite" restart="never" nodeType="tmRoot"/>
+      </p:par>
+    </p:tnLst>
+  </p:timing>
 </p:sld>
 </file>
 
-<file path=ppt/slides/slide31.xml><?xml version="1.0" encoding="utf-8"?>
+<file path=ppt/slides/slide32.xml><?xml version="1.0" encoding="utf-8"?>
 <p:sld xmlns:a="http://schemas.openxmlformats.org/drawingml/2006/main" xmlns:r="http://schemas.openxmlformats.org/officeDocument/2006/relationships" xmlns:p="http://schemas.openxmlformats.org/presentationml/2006/main">
   <p:cSld>
     <p:spTree>
@@ -13674,13 +13951,20 @@
   <p:clrMapOvr>
     <a:masterClrMapping/>
   </p:clrMapOvr>
-  <p:transition xmlns:p14="http://schemas.microsoft.com/office/powerpoint/2010/main" spd="slow">
+  <p:transition spd="slow">
     <p:cut/>
   </p:transition>
+  <p:timing>
+    <p:tnLst>
+      <p:par>
+        <p:cTn id="1" dur="indefinite" restart="never" nodeType="tmRoot"/>
+      </p:par>
+    </p:tnLst>
+  </p:timing>
 </p:sld>
 </file>
 
-<file path=ppt/slides/slide32.xml><?xml version="1.0" encoding="utf-8"?>
+<file path=ppt/slides/slide33.xml><?xml version="1.0" encoding="utf-8"?>
 <p:sld xmlns:a="http://schemas.openxmlformats.org/drawingml/2006/main" xmlns:r="http://schemas.openxmlformats.org/officeDocument/2006/relationships" xmlns:p="http://schemas.openxmlformats.org/presentationml/2006/main">
   <p:cSld>
     <p:spTree>
@@ -13868,9 +14152,16 @@
   <p:clrMapOvr>
     <a:masterClrMapping/>
   </p:clrMapOvr>
-  <p:transition xmlns:p14="http://schemas.microsoft.com/office/powerpoint/2010/main" spd="slow">
+  <p:transition spd="slow">
     <p:cut/>
   </p:transition>
+  <p:timing>
+    <p:tnLst>
+      <p:par>
+        <p:cTn id="1" dur="indefinite" restart="never" nodeType="tmRoot"/>
+      </p:par>
+    </p:tnLst>
+  </p:timing>
 </p:sld>
 </file>
 
@@ -13908,7 +14199,11 @@
           <a:p>
             <a:r>
               <a:rPr lang="en-US" dirty="0" smtClean="0"/>
-              <a:t>Task Breakdown</a:t>
+              <a:t>Task </a:t>
+            </a:r>
+            <a:r>
+              <a:rPr lang="en-US" dirty="0" smtClean="0"/>
+              <a:t>Breakdown &amp; Estimation</a:t>
             </a:r>
             <a:endParaRPr lang="en-US" dirty="0"/>
           </a:p>
@@ -13930,53 +14225,78 @@
           <a:lstStyle/>
           <a:p>
             <a:pPr marL="457200" indent="-457200">
+              <a:spcAft>
+                <a:spcPts val="600"/>
+              </a:spcAft>
               <a:buFont typeface="Arial"/>
               <a:buChar char="•"/>
             </a:pPr>
             <a:r>
               <a:rPr lang="en-US" dirty="0" smtClean="0"/>
-              <a:t>Previous documents are analyzed.</a:t>
-            </a:r>
+              <a:t>Previous </a:t>
+            </a:r>
+            <a:r>
+              <a:rPr lang="en-US" dirty="0" smtClean="0"/>
+              <a:t>SD documents </a:t>
+            </a:r>
+            <a:r>
+              <a:rPr lang="en-US" dirty="0" smtClean="0"/>
+              <a:t>are </a:t>
+            </a:r>
+            <a:r>
+              <a:rPr lang="en-US" dirty="0" smtClean="0"/>
+              <a:t>analyzed</a:t>
+            </a:r>
+            <a:endParaRPr lang="en-US" dirty="0" smtClean="0"/>
           </a:p>
           <a:p>
             <a:pPr marL="457200" indent="-457200">
+              <a:spcAft>
+                <a:spcPts val="600"/>
+              </a:spcAft>
               <a:buFont typeface="Arial"/>
               <a:buChar char="•"/>
             </a:pPr>
+            <a:r>
+              <a:rPr lang="en-US" dirty="0" smtClean="0"/>
+              <a:t>Task are assigned according to team member’s strengths and </a:t>
+            </a:r>
+            <a:r>
+              <a:rPr lang="en-US" dirty="0" smtClean="0"/>
+              <a:t>complexity</a:t>
+            </a:r>
             <a:endParaRPr lang="en-US" dirty="0" smtClean="0"/>
           </a:p>
           <a:p>
             <a:pPr marL="457200" indent="-457200">
+              <a:spcAft>
+                <a:spcPts val="600"/>
+              </a:spcAft>
               <a:buFont typeface="Arial"/>
               <a:buChar char="•"/>
             </a:pPr>
             <a:r>
               <a:rPr lang="en-US" dirty="0" smtClean="0"/>
-              <a:t>Task are assigned according to team member’s strengths and complexity.</a:t>
-            </a:r>
-          </a:p>
-          <a:p>
-            <a:pPr marL="457200" indent="-457200">
-              <a:buFont typeface="Arial"/>
-              <a:buChar char="•"/>
-            </a:pPr>
-            <a:endParaRPr lang="en-US" dirty="0" smtClean="0"/>
-          </a:p>
-          <a:p>
-            <a:pPr marL="457200" indent="-457200">
-              <a:buFont typeface="Arial"/>
-              <a:buChar char="•"/>
-            </a:pPr>
+              <a:t>Team has a internal deadline of </a:t>
+            </a:r>
             <a:r>
               <a:rPr lang="en-US" dirty="0" smtClean="0"/>
-              <a:t>Team has a internal deadline of 8 days before the external deadline.</a:t>
-            </a:r>
-          </a:p>
-          <a:p>
-            <a:pPr marL="457200" indent="-457200">
-              <a:buFont typeface="Arial"/>
-              <a:buChar char="•"/>
-            </a:pPr>
+              <a:t>a week</a:t>
+            </a:r>
+            <a:r>
+              <a:rPr lang="en-US" dirty="0" smtClean="0"/>
+              <a:t> </a:t>
+            </a:r>
+            <a:r>
+              <a:rPr lang="en-US" dirty="0" smtClean="0"/>
+              <a:t>before the external </a:t>
+            </a:r>
+            <a:r>
+              <a:rPr lang="en-US" dirty="0" smtClean="0"/>
+              <a:t>deadline</a:t>
+            </a:r>
+          </a:p>
+          <a:p>
             <a:endParaRPr lang="en-US" dirty="0" smtClean="0"/>
           </a:p>
           <a:p>
@@ -14005,10 +14325,322 @@
   <p:clrMapOvr>
     <a:masterClrMapping/>
   </p:clrMapOvr>
+  <p:timing>
+    <p:tnLst>
+      <p:par>
+        <p:cTn id="1" dur="indefinite" restart="never" nodeType="tmRoot"/>
+      </p:par>
+    </p:tnLst>
+  </p:timing>
 </p:sld>
 </file>
 
 <file path=ppt/slides/slide5.xml><?xml version="1.0" encoding="utf-8"?>
+<p:sld xmlns:a="http://schemas.openxmlformats.org/drawingml/2006/main" xmlns:r="http://schemas.openxmlformats.org/officeDocument/2006/relationships" xmlns:p="http://schemas.openxmlformats.org/presentationml/2006/main">
+  <p:cSld>
+    <p:spTree>
+      <p:nvGrpSpPr>
+        <p:cNvPr id="1" name=""/>
+        <p:cNvGrpSpPr/>
+        <p:nvPr/>
+      </p:nvGrpSpPr>
+      <p:grpSpPr>
+        <a:xfrm>
+          <a:off x="0" y="0"/>
+          <a:ext cx="0" cy="0"/>
+          <a:chOff x="0" y="0"/>
+          <a:chExt cx="0" cy="0"/>
+        </a:xfrm>
+      </p:grpSpPr>
+      <p:sp>
+        <p:nvSpPr>
+          <p:cNvPr id="2" name="Title 1"/>
+          <p:cNvSpPr>
+            <a:spLocks noGrp="1"/>
+          </p:cNvSpPr>
+          <p:nvPr>
+            <p:ph type="title"/>
+          </p:nvPr>
+        </p:nvSpPr>
+        <p:spPr/>
+        <p:txBody>
+          <a:bodyPr/>
+          <a:lstStyle/>
+          <a:p>
+            <a:r>
+              <a:rPr lang="en-US" dirty="0" smtClean="0"/>
+              <a:t>Estimation</a:t>
+            </a:r>
+            <a:endParaRPr lang="en-US" dirty="0"/>
+          </a:p>
+        </p:txBody>
+      </p:sp>
+      <p:sp>
+        <p:nvSpPr>
+          <p:cNvPr id="3" name="Text Placeholder 2"/>
+          <p:cNvSpPr>
+            <a:spLocks noGrp="1"/>
+          </p:cNvSpPr>
+          <p:nvPr>
+            <p:ph type="body" idx="1"/>
+          </p:nvPr>
+        </p:nvSpPr>
+        <p:spPr/>
+        <p:txBody>
+          <a:bodyPr/>
+          <a:lstStyle/>
+          <a:p>
+            <a:pPr marL="457200" indent="-457200">
+              <a:buFont typeface="Arial" panose="020B0604020202020204" pitchFamily="34" charset="0"/>
+              <a:buChar char="•"/>
+            </a:pPr>
+            <a:r>
+              <a:rPr lang="en-US" dirty="0" smtClean="0"/>
+              <a:t>Roughly 15 Hours per Week per Person</a:t>
+            </a:r>
+          </a:p>
+          <a:p>
+            <a:pPr marL="457200" indent="-457200">
+              <a:buFont typeface="Arial" panose="020B0604020202020204" pitchFamily="34" charset="0"/>
+              <a:buChar char="•"/>
+            </a:pPr>
+            <a:r>
+              <a:rPr lang="en-US" dirty="0" smtClean="0"/>
+              <a:t>Around 1920 Hours Total to Complete Project</a:t>
+            </a:r>
+          </a:p>
+          <a:p>
+            <a:pPr marL="457200" indent="-457200">
+              <a:buFont typeface="Arial" panose="020B0604020202020204" pitchFamily="34" charset="0"/>
+              <a:buChar char="•"/>
+            </a:pPr>
+            <a:r>
+              <a:rPr lang="en-US" dirty="0" smtClean="0"/>
+              <a:t>Estimate Doesn’t </a:t>
+            </a:r>
+            <a:r>
+              <a:rPr lang="en-US" dirty="0"/>
+              <a:t>T</a:t>
+            </a:r>
+            <a:r>
+              <a:rPr lang="en-US" dirty="0" smtClean="0"/>
+              <a:t>ake into Account </a:t>
+            </a:r>
+            <a:r>
+              <a:rPr lang="en-US" dirty="0"/>
+              <a:t>O</a:t>
+            </a:r>
+            <a:r>
+              <a:rPr lang="en-US" dirty="0" smtClean="0"/>
+              <a:t>ther Team </a:t>
+            </a:r>
+            <a:r>
+              <a:rPr lang="en-US" dirty="0"/>
+              <a:t>M</a:t>
+            </a:r>
+            <a:r>
+              <a:rPr lang="en-US" dirty="0" smtClean="0"/>
+              <a:t>ember’s </a:t>
+            </a:r>
+            <a:r>
+              <a:rPr lang="en-US" dirty="0"/>
+              <a:t>C</a:t>
+            </a:r>
+            <a:r>
+              <a:rPr lang="en-US" dirty="0" smtClean="0"/>
+              <a:t>ommitments</a:t>
+            </a:r>
+          </a:p>
+          <a:p>
+            <a:pPr marL="457200" indent="-457200">
+              <a:buFont typeface="Arial" panose="020B0604020202020204" pitchFamily="34" charset="0"/>
+              <a:buChar char="•"/>
+            </a:pPr>
+            <a:endParaRPr lang="en-US" dirty="0"/>
+          </a:p>
+        </p:txBody>
+      </p:sp>
+    </p:spTree>
+    <p:extLst>
+      <p:ext uri="{BB962C8B-B14F-4D97-AF65-F5344CB8AC3E}">
+        <p14:creationId xmlns:p14="http://schemas.microsoft.com/office/powerpoint/2010/main" val="4260144727"/>
+      </p:ext>
+    </p:extLst>
+  </p:cSld>
+  <p:clrMapOvr>
+    <a:masterClrMapping/>
+  </p:clrMapOvr>
+  <p:timing>
+    <p:tnLst>
+      <p:par>
+        <p:cTn id="1" dur="indefinite" restart="never" nodeType="tmRoot"/>
+      </p:par>
+    </p:tnLst>
+  </p:timing>
+</p:sld>
+</file>
+
+<file path=ppt/slides/slide6.xml><?xml version="1.0" encoding="utf-8"?>
+<p:sld xmlns:a="http://schemas.openxmlformats.org/drawingml/2006/main" xmlns:r="http://schemas.openxmlformats.org/officeDocument/2006/relationships" xmlns:p="http://schemas.openxmlformats.org/presentationml/2006/main">
+  <p:cSld>
+    <p:spTree>
+      <p:nvGrpSpPr>
+        <p:cNvPr id="1" name=""/>
+        <p:cNvGrpSpPr/>
+        <p:nvPr/>
+      </p:nvGrpSpPr>
+      <p:grpSpPr>
+        <a:xfrm>
+          <a:off x="0" y="0"/>
+          <a:ext cx="0" cy="0"/>
+          <a:chOff x="0" y="0"/>
+          <a:chExt cx="0" cy="0"/>
+        </a:xfrm>
+      </p:grpSpPr>
+      <p:sp>
+        <p:nvSpPr>
+          <p:cNvPr id="2" name="Title 1"/>
+          <p:cNvSpPr>
+            <a:spLocks noGrp="1"/>
+          </p:cNvSpPr>
+          <p:nvPr>
+            <p:ph type="title"/>
+          </p:nvPr>
+        </p:nvSpPr>
+        <p:spPr/>
+        <p:txBody>
+          <a:bodyPr/>
+          <a:lstStyle/>
+          <a:p>
+            <a:pPr algn="ctr"/>
+            <a:r>
+              <a:rPr lang="en-US" dirty="0" smtClean="0"/>
+              <a:t>Keeping Track of Progress</a:t>
+            </a:r>
+            <a:endParaRPr lang="en-US" dirty="0"/>
+          </a:p>
+        </p:txBody>
+      </p:sp>
+      <p:sp>
+        <p:nvSpPr>
+          <p:cNvPr id="3" name="Text Placeholder 2"/>
+          <p:cNvSpPr>
+            <a:spLocks noGrp="1"/>
+          </p:cNvSpPr>
+          <p:nvPr>
+            <p:ph type="body" idx="1"/>
+          </p:nvPr>
+        </p:nvSpPr>
+        <p:spPr/>
+        <p:txBody>
+          <a:bodyPr/>
+          <a:lstStyle/>
+          <a:p>
+            <a:r>
+              <a:rPr lang="en-US" sz="2800" dirty="0" smtClean="0"/>
+              <a:t>The following are use to keep track of progress:</a:t>
+            </a:r>
+          </a:p>
+          <a:p>
+            <a:pPr marL="457200" indent="-457200">
+              <a:buFont typeface="Arial" panose="020B0604020202020204" pitchFamily="34" charset="0"/>
+              <a:buChar char="•"/>
+            </a:pPr>
+            <a:r>
+              <a:rPr lang="en-US" sz="2800" dirty="0" smtClean="0"/>
+              <a:t>Baseline and Actual Start/Finish</a:t>
+            </a:r>
+          </a:p>
+          <a:p>
+            <a:pPr marL="457200" indent="-457200">
+              <a:buFont typeface="Arial" panose="020B0604020202020204" pitchFamily="34" charset="0"/>
+              <a:buChar char="•"/>
+            </a:pPr>
+            <a:r>
+              <a:rPr lang="en-US" sz="2800" dirty="0" smtClean="0"/>
+              <a:t>Resource Name</a:t>
+            </a:r>
+          </a:p>
+          <a:p>
+            <a:pPr marL="457200" indent="-457200">
+              <a:buFont typeface="Arial" panose="020B0604020202020204" pitchFamily="34" charset="0"/>
+              <a:buChar char="•"/>
+            </a:pPr>
+            <a:r>
+              <a:rPr lang="en-US" sz="2800" dirty="0" smtClean="0"/>
+              <a:t>BCWS (Budgeted Cost of Work Scheduled)</a:t>
+            </a:r>
+          </a:p>
+          <a:p>
+            <a:pPr marL="457200" indent="-457200">
+              <a:buFont typeface="Arial" panose="020B0604020202020204" pitchFamily="34" charset="0"/>
+              <a:buChar char="•"/>
+            </a:pPr>
+            <a:r>
+              <a:rPr lang="en-US" sz="2800" dirty="0" smtClean="0"/>
+              <a:t>ACWP (Actual Cost of Work Performed)</a:t>
+            </a:r>
+          </a:p>
+          <a:p>
+            <a:pPr marL="457200" indent="-457200">
+              <a:buFont typeface="Arial" panose="020B0604020202020204" pitchFamily="34" charset="0"/>
+              <a:buChar char="•"/>
+            </a:pPr>
+            <a:r>
+              <a:rPr lang="en-US" sz="2800" dirty="0" smtClean="0"/>
+              <a:t>BCWP (Budgeted Cost of Work Performed)</a:t>
+            </a:r>
+          </a:p>
+          <a:p>
+            <a:pPr marL="457200" indent="-457200">
+              <a:buFont typeface="Arial" panose="020B0604020202020204" pitchFamily="34" charset="0"/>
+              <a:buChar char="•"/>
+            </a:pPr>
+            <a:r>
+              <a:rPr lang="en-US" sz="2800" dirty="0" smtClean="0"/>
+              <a:t>CPI (Cost Performance Index)</a:t>
+            </a:r>
+          </a:p>
+          <a:p>
+            <a:pPr marL="457200" indent="-457200">
+              <a:buFont typeface="Arial" panose="020B0604020202020204" pitchFamily="34" charset="0"/>
+              <a:buChar char="•"/>
+            </a:pPr>
+            <a:r>
+              <a:rPr lang="en-US" sz="2800" dirty="0" smtClean="0"/>
+              <a:t>SPI (Schedule Performance Index)</a:t>
+            </a:r>
+          </a:p>
+          <a:p>
+            <a:pPr marL="457200" indent="-457200">
+              <a:buFont typeface="Arial" panose="020B0604020202020204" pitchFamily="34" charset="0"/>
+              <a:buChar char="•"/>
+            </a:pPr>
+            <a:endParaRPr lang="en-US" sz="2800" dirty="0"/>
+          </a:p>
+        </p:txBody>
+      </p:sp>
+    </p:spTree>
+    <p:extLst>
+      <p:ext uri="{BB962C8B-B14F-4D97-AF65-F5344CB8AC3E}">
+        <p14:creationId xmlns:p14="http://schemas.microsoft.com/office/powerpoint/2010/main" val="1073573917"/>
+      </p:ext>
+    </p:extLst>
+  </p:cSld>
+  <p:clrMapOvr>
+    <a:masterClrMapping/>
+  </p:clrMapOvr>
+  <p:timing>
+    <p:tnLst>
+      <p:par>
+        <p:cTn id="1" dur="indefinite" restart="never" nodeType="tmRoot"/>
+      </p:par>
+    </p:tnLst>
+  </p:timing>
+</p:sld>
+</file>
+
+<file path=ppt/slides/slide7.xml><?xml version="1.0" encoding="utf-8"?>
 <p:sld xmlns:a="http://schemas.openxmlformats.org/drawingml/2006/main" xmlns:r="http://schemas.openxmlformats.org/officeDocument/2006/relationships" xmlns:p="http://schemas.openxmlformats.org/presentationml/2006/main">
   <p:cSld>
     <p:spTree>
@@ -14131,20 +14763,20 @@
   <p:clrMapOvr>
     <a:masterClrMapping/>
   </p:clrMapOvr>
-  <p:transition xmlns:p14="http://schemas.microsoft.com/office/powerpoint/2010/main" spd="slow">
+  <p:transition spd="slow">
     <p:cut/>
   </p:transition>
   <p:timing>
     <p:tnLst>
       <p:par>
-        <p:cTn xmlns:p14="http://schemas.microsoft.com/office/powerpoint/2010/main" id="1" dur="indefinite" restart="never" nodeType="tmRoot"/>
+        <p:cTn id="1" dur="indefinite" restart="never" nodeType="tmRoot"/>
       </p:par>
     </p:tnLst>
   </p:timing>
 </p:sld>
 </file>
 
-<file path=ppt/slides/slide6.xml><?xml version="1.0" encoding="utf-8"?>
+<file path=ppt/slides/slide8.xml><?xml version="1.0" encoding="utf-8"?>
 <p:sld xmlns:a="http://schemas.openxmlformats.org/drawingml/2006/main" xmlns:r="http://schemas.openxmlformats.org/officeDocument/2006/relationships" xmlns:p="http://schemas.openxmlformats.org/presentationml/2006/main">
   <p:cSld>
     <p:spTree>
@@ -14267,170 +14899,20 @@
   <p:clrMapOvr>
     <a:masterClrMapping/>
   </p:clrMapOvr>
-  <p:transition xmlns:p14="http://schemas.microsoft.com/office/powerpoint/2010/main" spd="slow">
+  <p:transition spd="slow">
     <p:cut/>
   </p:transition>
   <p:timing>
     <p:tnLst>
       <p:par>
-        <p:cTn xmlns:p14="http://schemas.microsoft.com/office/powerpoint/2010/main" id="1" dur="indefinite" restart="never" nodeType="tmRoot"/>
+        <p:cTn id="1" dur="indefinite" restart="never" nodeType="tmRoot"/>
       </p:par>
     </p:tnLst>
   </p:timing>
 </p:sld>
 </file>
 
-<file path=ppt/slides/slide7.xml><?xml version="1.0" encoding="utf-8"?>
-<p:sld xmlns:a="http://schemas.openxmlformats.org/drawingml/2006/main" xmlns:r="http://schemas.openxmlformats.org/officeDocument/2006/relationships" xmlns:p="http://schemas.openxmlformats.org/presentationml/2006/main">
-  <p:cSld>
-    <p:spTree>
-      <p:nvGrpSpPr>
-        <p:cNvPr id="1" name="Shape 64"/>
-        <p:cNvGrpSpPr/>
-        <p:nvPr/>
-      </p:nvGrpSpPr>
-      <p:grpSpPr>
-        <a:xfrm>
-          <a:off x="0" y="0"/>
-          <a:ext cx="0" cy="0"/>
-          <a:chOff x="0" y="0"/>
-          <a:chExt cx="0" cy="0"/>
-        </a:xfrm>
-      </p:grpSpPr>
-      <p:sp>
-        <p:nvSpPr>
-          <p:cNvPr id="65" name="Shape 65"/>
-          <p:cNvSpPr txBox="1">
-            <a:spLocks noGrp="1"/>
-          </p:cNvSpPr>
-          <p:nvPr>
-            <p:ph type="title"/>
-          </p:nvPr>
-        </p:nvSpPr>
-        <p:spPr>
-          <a:xfrm>
-            <a:off x="457200" y="205978"/>
-            <a:ext cx="8229600" cy="857400"/>
-          </a:xfrm>
-          <a:prstGeom prst="rect">
-            <a:avLst/>
-          </a:prstGeom>
-        </p:spPr>
-        <p:txBody>
-          <a:bodyPr lIns="91425" tIns="91425" rIns="91425" bIns="91425" anchor="b" anchorCtr="0">
-            <a:noAutofit/>
-          </a:bodyPr>
-          <a:lstStyle/>
-          <a:p>
-            <a:pPr algn="ctr">
-              <a:spcBef>
-                <a:spcPts val="0"/>
-              </a:spcBef>
-              <a:buNone/>
-            </a:pPr>
-            <a:r>
-              <a:rPr lang="en"/>
-              <a:t>Task Estimation &amp; Breakdown</a:t>
-            </a:r>
-          </a:p>
-        </p:txBody>
-      </p:sp>
-      <p:sp>
-        <p:nvSpPr>
-          <p:cNvPr id="66" name="Shape 66"/>
-          <p:cNvSpPr txBox="1">
-            <a:spLocks noGrp="1"/>
-          </p:cNvSpPr>
-          <p:nvPr>
-            <p:ph type="body" idx="1"/>
-          </p:nvPr>
-        </p:nvSpPr>
-        <p:spPr>
-          <a:xfrm>
-            <a:off x="457200" y="1200150"/>
-            <a:ext cx="8229600" cy="3725699"/>
-          </a:xfrm>
-          <a:prstGeom prst="rect">
-            <a:avLst/>
-          </a:prstGeom>
-        </p:spPr>
-        <p:txBody>
-          <a:bodyPr lIns="91425" tIns="91425" rIns="91425" bIns="91425" anchor="t" anchorCtr="0">
-            <a:noAutofit/>
-          </a:bodyPr>
-          <a:lstStyle/>
-          <a:p>
-            <a:pPr marL="457200" lvl="0" indent="-419100" rtl="0">
-              <a:spcBef>
-                <a:spcPts val="0"/>
-              </a:spcBef>
-              <a:buClr>
-                <a:schemeClr val="dk2"/>
-              </a:buClr>
-              <a:buSzPct val="100000"/>
-              <a:buFont typeface="Arial"/>
-              <a:buChar char="●"/>
-            </a:pPr>
-            <a:r>
-              <a:rPr lang="en"/>
-              <a:t>Researched previous SD projects</a:t>
-            </a:r>
-          </a:p>
-          <a:p>
-            <a:pPr marL="457200" lvl="0" indent="-419100" rtl="0">
-              <a:spcBef>
-                <a:spcPts val="0"/>
-              </a:spcBef>
-              <a:buClr>
-                <a:schemeClr val="dk2"/>
-              </a:buClr>
-              <a:buSzPct val="100000"/>
-              <a:buFont typeface="Arial"/>
-              <a:buChar char="●"/>
-            </a:pPr>
-            <a:r>
-              <a:rPr lang="en"/>
-              <a:t>Ballpark estimation</a:t>
-            </a:r>
-          </a:p>
-          <a:p>
-            <a:pPr marL="457200" lvl="0" indent="-419100">
-              <a:spcBef>
-                <a:spcPts val="0"/>
-              </a:spcBef>
-              <a:buClr>
-                <a:schemeClr val="dk2"/>
-              </a:buClr>
-              <a:buSzPct val="100000"/>
-              <a:buFont typeface="Arial"/>
-              <a:buChar char="●"/>
-            </a:pPr>
-            <a:r>
-              <a:rPr lang="en"/>
-              <a:t>Task Assigning</a:t>
-            </a:r>
-          </a:p>
-        </p:txBody>
-      </p:sp>
-    </p:spTree>
-  </p:cSld>
-  <p:clrMapOvr>
-    <a:masterClrMapping/>
-  </p:clrMapOvr>
-  <p:transition xmlns:p14="http://schemas.microsoft.com/office/powerpoint/2010/main" spd="slow">
-    <p:cut/>
-  </p:transition>
-  <p:timing>
-    <p:tnLst>
-      <p:par>
-        <p:cTn xmlns:p14="http://schemas.microsoft.com/office/powerpoint/2010/main" id="1" dur="indefinite" restart="never" nodeType="tmRoot"/>
-      </p:par>
-    </p:tnLst>
-  </p:timing>
-</p:sld>
-</file>
-
-<file path=ppt/slides/slide8.xml><?xml version="1.0" encoding="utf-8"?>
+<file path=ppt/slides/slide9.xml><?xml version="1.0" encoding="utf-8"?>
 <p:sld xmlns:a="http://schemas.openxmlformats.org/drawingml/2006/main" xmlns:r="http://schemas.openxmlformats.org/officeDocument/2006/relationships" xmlns:p="http://schemas.openxmlformats.org/presentationml/2006/main">
   <p:cSld>
     <p:spTree>
@@ -14510,7 +14992,7 @@
           </a:bodyPr>
           <a:lstStyle/>
           <a:p>
-            <a:pPr marL="457200" lvl="0" indent="-419100" rtl="0">
+            <a:pPr marL="495300" lvl="0" indent="-457200" rtl="0">
               <a:spcBef>
                 <a:spcPts val="0"/>
               </a:spcBef>
@@ -14518,16 +15000,16 @@
                 <a:schemeClr val="dk2"/>
               </a:buClr>
               <a:buSzPct val="100000"/>
-              <a:buFont typeface="Arial"/>
-              <a:buChar char="●"/>
-            </a:pPr>
-            <a:r>
-              <a:rPr lang="en"/>
-              <a:t>Weekly Meetings</a:t>
-            </a:r>
-          </a:p>
-          <a:p>
-            <a:pPr marL="457200" lvl="0" indent="-419100">
+              <a:buFont typeface="Arial" panose="020B0604020202020204" pitchFamily="34" charset="0"/>
+              <a:buChar char="•"/>
+            </a:pPr>
+            <a:r>
+              <a:rPr lang="en" dirty="0" smtClean="0"/>
+              <a:t>Biweekly Meetings</a:t>
+            </a:r>
+          </a:p>
+          <a:p>
+            <a:pPr marL="38100" lvl="0" rtl="0">
               <a:spcBef>
                 <a:spcPts val="0"/>
               </a:spcBef>
@@ -14535,12 +15017,54 @@
                 <a:schemeClr val="dk2"/>
               </a:buClr>
               <a:buSzPct val="100000"/>
-              <a:buFont typeface="Arial"/>
-              <a:buChar char="●"/>
-            </a:pPr>
-            <a:r>
-              <a:rPr lang="en"/>
-              <a:t>Updates after any progress</a:t>
+            </a:pPr>
+            <a:r>
+              <a:rPr lang="en" dirty="0"/>
+              <a:t> </a:t>
+            </a:r>
+            <a:r>
+              <a:rPr lang="en" dirty="0" smtClean="0"/>
+              <a:t>   - Tuesdays and Saturdays</a:t>
+            </a:r>
+          </a:p>
+          <a:p>
+            <a:pPr marL="38100" lvl="0" rtl="0">
+              <a:spcBef>
+                <a:spcPts val="0"/>
+              </a:spcBef>
+              <a:buClr>
+                <a:schemeClr val="dk2"/>
+              </a:buClr>
+              <a:buSzPct val="100000"/>
+            </a:pPr>
+            <a:r>
+              <a:rPr lang="en" dirty="0"/>
+              <a:t> </a:t>
+            </a:r>
+            <a:r>
+              <a:rPr lang="en" dirty="0" smtClean="0"/>
+              <a:t>   - Report progress and update project plan</a:t>
+            </a:r>
+          </a:p>
+          <a:p>
+            <a:pPr marL="495300" lvl="0" indent="-457200">
+              <a:spcBef>
+                <a:spcPts val="0"/>
+              </a:spcBef>
+              <a:buClr>
+                <a:schemeClr val="dk2"/>
+              </a:buClr>
+              <a:buSzPct val="100000"/>
+              <a:buFont typeface="Arial" panose="020B0604020202020204" pitchFamily="34" charset="0"/>
+              <a:buChar char="•"/>
+            </a:pPr>
+            <a:r>
+              <a:rPr lang="en" dirty="0" smtClean="0"/>
+              <a:t>Updates </a:t>
+            </a:r>
+            <a:r>
+              <a:rPr lang="en" dirty="0"/>
+              <a:t>after any progress</a:t>
             </a:r>
           </a:p>
         </p:txBody>
@@ -14550,206 +15074,16 @@
   <p:clrMapOvr>
     <a:masterClrMapping/>
   </p:clrMapOvr>
-  <p:transition xmlns:p14="http://schemas.microsoft.com/office/powerpoint/2010/main" spd="slow">
+  <p:transition spd="slow">
     <p:cut/>
   </p:transition>
-</p:sld>
-</file>
-
-<file path=ppt/slides/slide9.xml><?xml version="1.0" encoding="utf-8"?>
-<p:sld xmlns:a="http://schemas.openxmlformats.org/drawingml/2006/main" xmlns:r="http://schemas.openxmlformats.org/officeDocument/2006/relationships" xmlns:p="http://schemas.openxmlformats.org/presentationml/2006/main">
-  <p:cSld>
-    <p:spTree>
-      <p:nvGrpSpPr>
-        <p:cNvPr id="1" name="Shape 76"/>
-        <p:cNvGrpSpPr/>
-        <p:nvPr/>
-      </p:nvGrpSpPr>
-      <p:grpSpPr>
-        <a:xfrm>
-          <a:off x="0" y="0"/>
-          <a:ext cx="0" cy="0"/>
-          <a:chOff x="0" y="0"/>
-          <a:chExt cx="0" cy="0"/>
-        </a:xfrm>
-      </p:grpSpPr>
-      <p:sp>
-        <p:nvSpPr>
-          <p:cNvPr id="77" name="Shape 77"/>
-          <p:cNvSpPr txBox="1">
-            <a:spLocks noGrp="1"/>
-          </p:cNvSpPr>
-          <p:nvPr>
-            <p:ph type="title"/>
-          </p:nvPr>
-        </p:nvSpPr>
-        <p:spPr>
-          <a:xfrm>
-            <a:off x="457200" y="205978"/>
-            <a:ext cx="8229600" cy="857400"/>
-          </a:xfrm>
-          <a:prstGeom prst="rect">
-            <a:avLst/>
-          </a:prstGeom>
-        </p:spPr>
-        <p:txBody>
-          <a:bodyPr lIns="91425" tIns="91425" rIns="91425" bIns="91425" anchor="b" anchorCtr="0">
-            <a:noAutofit/>
-          </a:bodyPr>
-          <a:lstStyle/>
-          <a:p>
-            <a:pPr marL="0" marR="0" indent="0" algn="ctr" rtl="0">
-              <a:lnSpc>
-                <a:spcPct val="100000"/>
-              </a:lnSpc>
-              <a:spcBef>
-                <a:spcPts val="0"/>
-              </a:spcBef>
-              <a:spcAft>
-                <a:spcPts val="0"/>
-              </a:spcAft>
-              <a:buNone/>
-            </a:pPr>
-            <a:r>
-              <a:rPr lang="en" dirty="0"/>
-              <a:t>General Organization</a:t>
-            </a:r>
-          </a:p>
-        </p:txBody>
-      </p:sp>
-      <p:sp>
-        <p:nvSpPr>
-          <p:cNvPr id="78" name="Shape 78"/>
-          <p:cNvSpPr txBox="1">
-            <a:spLocks noGrp="1"/>
-          </p:cNvSpPr>
-          <p:nvPr>
-            <p:ph type="body" idx="1"/>
-          </p:nvPr>
-        </p:nvSpPr>
-        <p:spPr>
-          <a:xfrm>
-            <a:off x="457200" y="1200150"/>
-            <a:ext cx="8229600" cy="3725699"/>
-          </a:xfrm>
-          <a:prstGeom prst="rect">
-            <a:avLst/>
-          </a:prstGeom>
-        </p:spPr>
-        <p:txBody>
-          <a:bodyPr lIns="91425" tIns="91425" rIns="91425" bIns="91425" anchor="t" anchorCtr="0">
-            <a:noAutofit/>
-          </a:bodyPr>
-          <a:lstStyle/>
-          <a:p>
-            <a:pPr marL="0" marR="0" indent="0" algn="l" rtl="0">
-              <a:lnSpc>
-                <a:spcPct val="115000"/>
-              </a:lnSpc>
-              <a:spcBef>
-                <a:spcPts val="800"/>
-              </a:spcBef>
-              <a:spcAft>
-                <a:spcPts val="0"/>
-              </a:spcAft>
-              <a:buNone/>
-            </a:pPr>
-            <a:r>
-              <a:rPr lang="en" sz="2400"/>
-              <a:t>•Project Manager: Karla Hernandez</a:t>
-            </a:r>
-          </a:p>
-          <a:p>
-            <a:pPr marL="0" marR="0" indent="0" algn="l" rtl="0">
-              <a:lnSpc>
-                <a:spcPct val="115000"/>
-              </a:lnSpc>
-              <a:spcBef>
-                <a:spcPts val="800"/>
-              </a:spcBef>
-              <a:spcAft>
-                <a:spcPts val="0"/>
-              </a:spcAft>
-              <a:buNone/>
-            </a:pPr>
-            <a:r>
-              <a:rPr lang="en" sz="2400"/>
-              <a:t>•Responsibilities:</a:t>
-            </a:r>
-          </a:p>
-          <a:p>
-            <a:pPr marL="457200" marR="0" indent="0" algn="l" rtl="0">
-              <a:lnSpc>
-                <a:spcPct val="115000"/>
-              </a:lnSpc>
-              <a:spcBef>
-                <a:spcPts val="800"/>
-              </a:spcBef>
-              <a:spcAft>
-                <a:spcPts val="0"/>
-              </a:spcAft>
-              <a:buNone/>
-            </a:pPr>
-            <a:r>
-              <a:rPr lang="en" sz="2400"/>
-              <a:t>–Guiding team</a:t>
-            </a:r>
-          </a:p>
-          <a:p>
-            <a:pPr marL="457200" marR="0" indent="0" algn="l" rtl="0">
-              <a:lnSpc>
-                <a:spcPct val="115000"/>
-              </a:lnSpc>
-              <a:spcBef>
-                <a:spcPts val="800"/>
-              </a:spcBef>
-              <a:spcAft>
-                <a:spcPts val="0"/>
-              </a:spcAft>
-              <a:buNone/>
-            </a:pPr>
-            <a:r>
-              <a:rPr lang="en" sz="2400"/>
-              <a:t>–Main point of contact with sponsor</a:t>
-            </a:r>
-          </a:p>
-          <a:p>
-            <a:pPr marL="457200" marR="0" indent="0" algn="l" rtl="0">
-              <a:lnSpc>
-                <a:spcPct val="115000"/>
-              </a:lnSpc>
-              <a:spcBef>
-                <a:spcPts val="800"/>
-              </a:spcBef>
-              <a:spcAft>
-                <a:spcPts val="0"/>
-              </a:spcAft>
-              <a:buNone/>
-            </a:pPr>
-            <a:r>
-              <a:rPr lang="en" sz="2400"/>
-              <a:t>–Schedules team meetings</a:t>
-            </a:r>
-          </a:p>
-          <a:p>
-            <a:pPr>
-              <a:spcBef>
-                <a:spcPts val="0"/>
-              </a:spcBef>
-              <a:buNone/>
-            </a:pPr>
-            <a:endParaRPr/>
-          </a:p>
-        </p:txBody>
-      </p:sp>
-    </p:spTree>
-  </p:cSld>
-  <p:clrMapOvr>
-    <a:masterClrMapping/>
-  </p:clrMapOvr>
-  <p:transition xmlns:p14="http://schemas.microsoft.com/office/powerpoint/2010/main" spd="slow">
-    <p:cut/>
-  </p:transition>
+  <p:timing>
+    <p:tnLst>
+      <p:par>
+        <p:cTn id="1" dur="indefinite" restart="never" nodeType="tmRoot"/>
+      </p:par>
+    </p:tnLst>
+  </p:timing>
 </p:sld>
 </file>
 

</xml_diff>

<commit_message>
Final presentation - did a touch of editing, centering headings and adjusting bullet point sizes
</commit_message>
<xml_diff>
--- a/Presentations/Project Charter Presentation.pptx
+++ b/Presentations/Project Charter Presentation.pptx
@@ -254,6 +254,22 @@
       </a:defRPr>
     </a:lvl9pPr>
   </p:defaultTextStyle>
+  <p:extLst>
+    <p:ext uri="{EFAFB233-063F-42B5-8137-9DF3F51BA10A}">
+      <p15:sldGuideLst xmlns:p15="http://schemas.microsoft.com/office/powerpoint/2012/main">
+        <p15:guide id="1" orient="horz" pos="1620">
+          <p15:clr>
+            <a:srgbClr val="A4A3A4"/>
+          </p15:clr>
+        </p15:guide>
+        <p15:guide id="2" pos="2880">
+          <p15:clr>
+            <a:srgbClr val="A4A3A4"/>
+          </p15:clr>
+        </p15:guide>
+      </p15:sldGuideLst>
+    </p:ext>
+  </p:extLst>
 </p:presentation>
 </file>
 
@@ -626,6 +642,11 @@
         </p:txBody>
       </p:sp>
     </p:spTree>
+    <p:extLst>
+      <p:ext uri="{BB962C8B-B14F-4D97-AF65-F5344CB8AC3E}">
+        <p14:creationId xmlns:p14="http://schemas.microsoft.com/office/powerpoint/2010/main" val="3742721260"/>
+      </p:ext>
+    </p:extLst>
   </p:cSld>
   <p:clrMapOvr>
     <a:masterClrMapping/>
@@ -814,6 +835,11 @@
         </p:txBody>
       </p:sp>
     </p:spTree>
+    <p:extLst>
+      <p:ext uri="{BB962C8B-B14F-4D97-AF65-F5344CB8AC3E}">
+        <p14:creationId xmlns:p14="http://schemas.microsoft.com/office/powerpoint/2010/main" val="1127001054"/>
+      </p:ext>
+    </p:extLst>
   </p:cSld>
   <p:clrMapOvr>
     <a:masterClrMapping/>
@@ -928,6 +954,11 @@
         </p:txBody>
       </p:sp>
     </p:spTree>
+    <p:extLst>
+      <p:ext uri="{BB962C8B-B14F-4D97-AF65-F5344CB8AC3E}">
+        <p14:creationId xmlns:p14="http://schemas.microsoft.com/office/powerpoint/2010/main" val="4156317525"/>
+      </p:ext>
+    </p:extLst>
   </p:cSld>
   <p:clrMapOvr>
     <a:masterClrMapping/>
@@ -1042,6 +1073,11 @@
         </p:txBody>
       </p:sp>
     </p:spTree>
+    <p:extLst>
+      <p:ext uri="{BB962C8B-B14F-4D97-AF65-F5344CB8AC3E}">
+        <p14:creationId xmlns:p14="http://schemas.microsoft.com/office/powerpoint/2010/main" val="1927721171"/>
+      </p:ext>
+    </p:extLst>
   </p:cSld>
   <p:clrMapOvr>
     <a:masterClrMapping/>
@@ -1156,6 +1192,11 @@
         </p:txBody>
       </p:sp>
     </p:spTree>
+    <p:extLst>
+      <p:ext uri="{BB962C8B-B14F-4D97-AF65-F5344CB8AC3E}">
+        <p14:creationId xmlns:p14="http://schemas.microsoft.com/office/powerpoint/2010/main" val="243210301"/>
+      </p:ext>
+    </p:extLst>
   </p:cSld>
   <p:clrMapOvr>
     <a:masterClrMapping/>
@@ -1270,6 +1311,11 @@
         </p:txBody>
       </p:sp>
     </p:spTree>
+    <p:extLst>
+      <p:ext uri="{BB962C8B-B14F-4D97-AF65-F5344CB8AC3E}">
+        <p14:creationId xmlns:p14="http://schemas.microsoft.com/office/powerpoint/2010/main" val="311213546"/>
+      </p:ext>
+    </p:extLst>
   </p:cSld>
   <p:clrMapOvr>
     <a:masterClrMapping/>
@@ -1384,6 +1430,11 @@
         </p:txBody>
       </p:sp>
     </p:spTree>
+    <p:extLst>
+      <p:ext uri="{BB962C8B-B14F-4D97-AF65-F5344CB8AC3E}">
+        <p14:creationId xmlns:p14="http://schemas.microsoft.com/office/powerpoint/2010/main" val="4102588945"/>
+      </p:ext>
+    </p:extLst>
   </p:cSld>
   <p:clrMapOvr>
     <a:masterClrMapping/>
@@ -1498,6 +1549,11 @@
         </p:txBody>
       </p:sp>
     </p:spTree>
+    <p:extLst>
+      <p:ext uri="{BB962C8B-B14F-4D97-AF65-F5344CB8AC3E}">
+        <p14:creationId xmlns:p14="http://schemas.microsoft.com/office/powerpoint/2010/main" val="53040967"/>
+      </p:ext>
+    </p:extLst>
   </p:cSld>
   <p:clrMapOvr>
     <a:masterClrMapping/>
@@ -1534,8 +1590,8 @@
         </p:nvSpPr>
         <p:spPr>
           <a:xfrm>
-            <a:off x="381187" y="685800"/>
-            <a:ext cx="6096299" cy="3429000"/>
+            <a:off x="381000" y="685800"/>
+            <a:ext cx="6096000" cy="3429000"/>
           </a:xfrm>
           <a:custGeom>
             <a:avLst/>
@@ -1612,6 +1668,11 @@
         </p:txBody>
       </p:sp>
     </p:spTree>
+    <p:extLst>
+      <p:ext uri="{BB962C8B-B14F-4D97-AF65-F5344CB8AC3E}">
+        <p14:creationId xmlns:p14="http://schemas.microsoft.com/office/powerpoint/2010/main" val="831121426"/>
+      </p:ext>
+    </p:extLst>
   </p:cSld>
   <p:clrMapOvr>
     <a:masterClrMapping/>
@@ -1648,8 +1709,8 @@
         </p:nvSpPr>
         <p:spPr>
           <a:xfrm>
-            <a:off x="381187" y="685800"/>
-            <a:ext cx="6096299" cy="3429000"/>
+            <a:off x="381000" y="685800"/>
+            <a:ext cx="6096000" cy="3429000"/>
           </a:xfrm>
           <a:custGeom>
             <a:avLst/>
@@ -1726,6 +1787,11 @@
         </p:txBody>
       </p:sp>
     </p:spTree>
+    <p:extLst>
+      <p:ext uri="{BB962C8B-B14F-4D97-AF65-F5344CB8AC3E}">
+        <p14:creationId xmlns:p14="http://schemas.microsoft.com/office/powerpoint/2010/main" val="2590343697"/>
+      </p:ext>
+    </p:extLst>
   </p:cSld>
   <p:clrMapOvr>
     <a:masterClrMapping/>
@@ -1840,6 +1906,11 @@
         </p:txBody>
       </p:sp>
     </p:spTree>
+    <p:extLst>
+      <p:ext uri="{BB962C8B-B14F-4D97-AF65-F5344CB8AC3E}">
+        <p14:creationId xmlns:p14="http://schemas.microsoft.com/office/powerpoint/2010/main" val="1076451697"/>
+      </p:ext>
+    </p:extLst>
   </p:cSld>
   <p:clrMapOvr>
     <a:masterClrMapping/>
@@ -1954,6 +2025,11 @@
         </p:txBody>
       </p:sp>
     </p:spTree>
+    <p:extLst>
+      <p:ext uri="{BB962C8B-B14F-4D97-AF65-F5344CB8AC3E}">
+        <p14:creationId xmlns:p14="http://schemas.microsoft.com/office/powerpoint/2010/main" val="1394231836"/>
+      </p:ext>
+    </p:extLst>
   </p:cSld>
   <p:clrMapOvr>
     <a:masterClrMapping/>
@@ -2069,6 +2145,11 @@
         </p:txBody>
       </p:sp>
     </p:spTree>
+    <p:extLst>
+      <p:ext uri="{BB962C8B-B14F-4D97-AF65-F5344CB8AC3E}">
+        <p14:creationId xmlns:p14="http://schemas.microsoft.com/office/powerpoint/2010/main" val="502549020"/>
+      </p:ext>
+    </p:extLst>
   </p:cSld>
   <p:clrMapOvr>
     <a:masterClrMapping/>
@@ -2183,6 +2264,11 @@
         </p:txBody>
       </p:sp>
     </p:spTree>
+    <p:extLst>
+      <p:ext uri="{BB962C8B-B14F-4D97-AF65-F5344CB8AC3E}">
+        <p14:creationId xmlns:p14="http://schemas.microsoft.com/office/powerpoint/2010/main" val="1232133892"/>
+      </p:ext>
+    </p:extLst>
   </p:cSld>
   <p:clrMapOvr>
     <a:masterClrMapping/>
@@ -2297,6 +2383,11 @@
         </p:txBody>
       </p:sp>
     </p:spTree>
+    <p:extLst>
+      <p:ext uri="{BB962C8B-B14F-4D97-AF65-F5344CB8AC3E}">
+        <p14:creationId xmlns:p14="http://schemas.microsoft.com/office/powerpoint/2010/main" val="2434761362"/>
+      </p:ext>
+    </p:extLst>
   </p:cSld>
   <p:clrMapOvr>
     <a:masterClrMapping/>
@@ -2411,6 +2502,11 @@
         </p:txBody>
       </p:sp>
     </p:spTree>
+    <p:extLst>
+      <p:ext uri="{BB962C8B-B14F-4D97-AF65-F5344CB8AC3E}">
+        <p14:creationId xmlns:p14="http://schemas.microsoft.com/office/powerpoint/2010/main" val="3724238356"/>
+      </p:ext>
+    </p:extLst>
   </p:cSld>
   <p:clrMapOvr>
     <a:masterClrMapping/>
@@ -2525,6 +2621,11 @@
         </p:txBody>
       </p:sp>
     </p:spTree>
+    <p:extLst>
+      <p:ext uri="{BB962C8B-B14F-4D97-AF65-F5344CB8AC3E}">
+        <p14:creationId xmlns:p14="http://schemas.microsoft.com/office/powerpoint/2010/main" val="236511117"/>
+      </p:ext>
+    </p:extLst>
   </p:cSld>
   <p:clrMapOvr>
     <a:masterClrMapping/>
@@ -2639,6 +2740,11 @@
         </p:txBody>
       </p:sp>
     </p:spTree>
+    <p:extLst>
+      <p:ext uri="{BB962C8B-B14F-4D97-AF65-F5344CB8AC3E}">
+        <p14:creationId xmlns:p14="http://schemas.microsoft.com/office/powerpoint/2010/main" val="2241110128"/>
+      </p:ext>
+    </p:extLst>
   </p:cSld>
   <p:clrMapOvr>
     <a:masterClrMapping/>
@@ -2753,6 +2859,11 @@
         </p:txBody>
       </p:sp>
     </p:spTree>
+    <p:extLst>
+      <p:ext uri="{BB962C8B-B14F-4D97-AF65-F5344CB8AC3E}">
+        <p14:creationId xmlns:p14="http://schemas.microsoft.com/office/powerpoint/2010/main" val="583240726"/>
+      </p:ext>
+    </p:extLst>
   </p:cSld>
   <p:clrMapOvr>
     <a:masterClrMapping/>
@@ -2860,13 +2971,19 @@
               <a:buNone/>
             </a:pPr>
             <a:r>
-              <a:rPr lang="en"/>
-              <a:t>Karla, Carlos &amp; Joe prepare in case Karla doesn’t show up, slides 8 thru 12</a:t>
-            </a:r>
+              <a:rPr lang="en" dirty="0" smtClean="0"/>
+              <a:t>Joe</a:t>
+            </a:r>
+            <a:endParaRPr lang="en" dirty="0"/>
           </a:p>
         </p:txBody>
       </p:sp>
     </p:spTree>
+    <p:extLst>
+      <p:ext uri="{BB962C8B-B14F-4D97-AF65-F5344CB8AC3E}">
+        <p14:creationId xmlns:p14="http://schemas.microsoft.com/office/powerpoint/2010/main" val="1658067083"/>
+      </p:ext>
+    </p:extLst>
   </p:cSld>
   <p:clrMapOvr>
     <a:masterClrMapping/>
@@ -2974,13 +3091,19 @@
               <a:buNone/>
             </a:pPr>
             <a:r>
-              <a:rPr lang="en"/>
-              <a:t>Karla</a:t>
-            </a:r>
+              <a:rPr lang="en" dirty="0" smtClean="0"/>
+              <a:t>Joe</a:t>
+            </a:r>
+            <a:endParaRPr lang="en" dirty="0"/>
           </a:p>
         </p:txBody>
       </p:sp>
     </p:spTree>
+    <p:extLst>
+      <p:ext uri="{BB962C8B-B14F-4D97-AF65-F5344CB8AC3E}">
+        <p14:creationId xmlns:p14="http://schemas.microsoft.com/office/powerpoint/2010/main" val="2349308169"/>
+      </p:ext>
+    </p:extLst>
   </p:cSld>
   <p:clrMapOvr>
     <a:masterClrMapping/>
@@ -3088,13 +3211,19 @@
               <a:buNone/>
             </a:pPr>
             <a:r>
-              <a:rPr lang="en"/>
-              <a:t>Karla</a:t>
-            </a:r>
+              <a:rPr lang="en" dirty="0" smtClean="0"/>
+              <a:t>Joe</a:t>
+            </a:r>
+            <a:endParaRPr lang="en" dirty="0"/>
           </a:p>
         </p:txBody>
       </p:sp>
     </p:spTree>
+    <p:extLst>
+      <p:ext uri="{BB962C8B-B14F-4D97-AF65-F5344CB8AC3E}">
+        <p14:creationId xmlns:p14="http://schemas.microsoft.com/office/powerpoint/2010/main" val="3560621370"/>
+      </p:ext>
+    </p:extLst>
   </p:cSld>
   <p:clrMapOvr>
     <a:masterClrMapping/>
@@ -3202,13 +3331,18 @@
               <a:buNone/>
             </a:pPr>
             <a:r>
-              <a:rPr lang="en"/>
+              <a:rPr lang="en" dirty="0"/>
               <a:t>Joe</a:t>
             </a:r>
           </a:p>
         </p:txBody>
       </p:sp>
     </p:spTree>
+    <p:extLst>
+      <p:ext uri="{BB962C8B-B14F-4D97-AF65-F5344CB8AC3E}">
+        <p14:creationId xmlns:p14="http://schemas.microsoft.com/office/powerpoint/2010/main" val="2767570200"/>
+      </p:ext>
+    </p:extLst>
   </p:cSld>
   <p:clrMapOvr>
     <a:masterClrMapping/>
@@ -3316,13 +3450,19 @@
               <a:buNone/>
             </a:pPr>
             <a:r>
-              <a:rPr lang="en"/>
-              <a:t>Karla, </a:t>
-            </a:r>
+              <a:rPr lang="en" dirty="0" smtClean="0"/>
+              <a:t>Joe</a:t>
+            </a:r>
+            <a:endParaRPr lang="en" dirty="0"/>
           </a:p>
         </p:txBody>
       </p:sp>
     </p:spTree>
+    <p:extLst>
+      <p:ext uri="{BB962C8B-B14F-4D97-AF65-F5344CB8AC3E}">
+        <p14:creationId xmlns:p14="http://schemas.microsoft.com/office/powerpoint/2010/main" val="3893320865"/>
+      </p:ext>
+    </p:extLst>
   </p:cSld>
   <p:clrMapOvr>
     <a:masterClrMapping/>
@@ -3437,6 +3577,11 @@
         </p:txBody>
       </p:sp>
     </p:spTree>
+    <p:extLst>
+      <p:ext uri="{BB962C8B-B14F-4D97-AF65-F5344CB8AC3E}">
+        <p14:creationId xmlns:p14="http://schemas.microsoft.com/office/powerpoint/2010/main" val="2372353382"/>
+      </p:ext>
+    </p:extLst>
   </p:cSld>
   <p:clrMapOvr>
     <a:masterClrMapping/>
@@ -5939,13 +6084,13 @@
   <p:clrMapOvr>
     <a:masterClrMapping/>
   </p:clrMapOvr>
-  <p:transition xmlns:p14="http://schemas.microsoft.com/office/powerpoint/2010/main" spd="slow">
+  <p:transition spd="slow">
     <p:cut/>
   </p:transition>
   <p:timing>
     <p:tnLst>
       <p:par>
-        <p:cTn xmlns:p14="http://schemas.microsoft.com/office/powerpoint/2010/main" id="1" dur="indefinite" restart="never" nodeType="tmRoot"/>
+        <p:cTn id="1" dur="indefinite" restart="never" nodeType="tmRoot"/>
       </p:par>
     </p:tnLst>
   </p:timing>
@@ -6064,7 +6209,15 @@
             </a:r>
             <a:r>
               <a:rPr lang="en" sz="2400" dirty="0"/>
-              <a:t>week before due date</a:t>
+              <a:t>week before </a:t>
+            </a:r>
+            <a:r>
+              <a:rPr lang="en" sz="2400" dirty="0" smtClean="0"/>
+              <a:t>official due </a:t>
+            </a:r>
+            <a:r>
+              <a:rPr lang="en" sz="2400" dirty="0"/>
+              <a:t>date</a:t>
             </a:r>
           </a:p>
           <a:p>
@@ -6145,13 +6298,13 @@
   <p:clrMapOvr>
     <a:masterClrMapping/>
   </p:clrMapOvr>
-  <p:transition xmlns:p14="http://schemas.microsoft.com/office/powerpoint/2010/main" spd="slow">
+  <p:transition spd="slow">
     <p:cut/>
   </p:transition>
   <p:timing>
     <p:tnLst>
       <p:par>
-        <p:cTn xmlns:p14="http://schemas.microsoft.com/office/powerpoint/2010/main" id="1" dur="indefinite" restart="never" nodeType="tmRoot"/>
+        <p:cTn id="1" dur="indefinite" restart="never" nodeType="tmRoot"/>
       </p:par>
     </p:tnLst>
   </p:timing>
@@ -6251,11 +6404,7 @@
             </a:pPr>
             <a:r>
               <a:rPr lang="en" dirty="0" smtClean="0"/>
-              <a:t>Task Breakdown &amp; </a:t>
-            </a:r>
-            <a:r>
-              <a:rPr lang="en" dirty="0" smtClean="0"/>
-              <a:t>Estimation</a:t>
+              <a:t>Task Breakdown &amp; Estimation</a:t>
             </a:r>
             <a:endParaRPr lang="en-US" dirty="0" smtClean="0"/>
           </a:p>
@@ -6287,11 +6436,7 @@
             </a:pPr>
             <a:r>
               <a:rPr lang="en" dirty="0" smtClean="0"/>
-              <a:t>Keeping Track of </a:t>
-            </a:r>
-            <a:r>
-              <a:rPr lang="en" dirty="0" smtClean="0"/>
-              <a:t>Progress</a:t>
+              <a:t>Keeping Track of Progress</a:t>
             </a:r>
             <a:endParaRPr lang="en-US" dirty="0" smtClean="0"/>
           </a:p>
@@ -6323,11 +6468,7 @@
             </a:pPr>
             <a:r>
               <a:rPr lang="en" dirty="0" smtClean="0"/>
-              <a:t>Overview of the Project </a:t>
-            </a:r>
-            <a:r>
-              <a:rPr lang="en" dirty="0" smtClean="0"/>
-              <a:t>Plan</a:t>
+              <a:t>Overview of the Project Plan</a:t>
             </a:r>
             <a:endParaRPr lang="en-US" dirty="0" smtClean="0"/>
           </a:p>
@@ -6370,13 +6511,13 @@
   <p:clrMapOvr>
     <a:masterClrMapping/>
   </p:clrMapOvr>
-  <p:transition xmlns:p14="http://schemas.microsoft.com/office/powerpoint/2010/main" spd="slow">
+  <p:transition spd="slow">
     <p:cut/>
   </p:transition>
   <p:timing>
     <p:tnLst>
       <p:par>
-        <p:cTn xmlns:p14="http://schemas.microsoft.com/office/powerpoint/2010/main" id="1" dur="indefinite" restart="never" nodeType="tmRoot"/>
+        <p:cTn id="1" dur="indefinite" restart="never" nodeType="tmRoot"/>
       </p:par>
     </p:tnLst>
   </p:timing>
@@ -6415,6 +6556,7 @@
           <a:bodyPr/>
           <a:lstStyle/>
           <a:p>
+            <a:pPr algn="ctr"/>
             <a:r>
               <a:rPr lang="en-US" dirty="0" smtClean="0"/>
               <a:t>Task Breakdown &amp; Estimation</a:t>
@@ -6508,7 +6650,7 @@
   <p:timing>
     <p:tnLst>
       <p:par>
-        <p:cTn xmlns:p14="http://schemas.microsoft.com/office/powerpoint/2010/main" id="1" dur="indefinite" restart="never" nodeType="tmRoot"/>
+        <p:cTn id="1" dur="indefinite" restart="never" nodeType="tmRoot"/>
       </p:par>
     </p:tnLst>
   </p:timing>
@@ -6547,6 +6689,7 @@
           <a:bodyPr/>
           <a:lstStyle/>
           <a:p>
+            <a:pPr algn="ctr"/>
             <a:r>
               <a:rPr lang="en-US" dirty="0" smtClean="0"/>
               <a:t>Estimation</a:t>
@@ -6653,7 +6796,7 @@
   <p:timing>
     <p:tnLst>
       <p:par>
-        <p:cTn xmlns:p14="http://schemas.microsoft.com/office/powerpoint/2010/main" id="1" dur="indefinite" restart="never" nodeType="tmRoot"/>
+        <p:cTn id="1" dur="indefinite" restart="never" nodeType="tmRoot"/>
       </p:par>
     </p:tnLst>
   </p:timing>
@@ -6813,7 +6956,7 @@
   <p:timing>
     <p:tnLst>
       <p:par>
-        <p:cTn xmlns:p14="http://schemas.microsoft.com/office/powerpoint/2010/main" id="1" dur="indefinite" restart="never" nodeType="tmRoot"/>
+        <p:cTn id="1" dur="indefinite" restart="never" nodeType="tmRoot"/>
       </p:par>
     </p:tnLst>
   </p:timing>
@@ -6943,13 +7086,13 @@
   <p:clrMapOvr>
     <a:masterClrMapping/>
   </p:clrMapOvr>
-  <p:transition xmlns:p14="http://schemas.microsoft.com/office/powerpoint/2010/main" spd="slow">
+  <p:transition spd="slow">
     <p:cut/>
   </p:transition>
   <p:timing>
     <p:tnLst>
       <p:par>
-        <p:cTn xmlns:p14="http://schemas.microsoft.com/office/powerpoint/2010/main" id="1" dur="indefinite" restart="never" nodeType="tmRoot"/>
+        <p:cTn id="1" dur="indefinite" restart="never" nodeType="tmRoot"/>
       </p:par>
     </p:tnLst>
   </p:timing>
@@ -7079,13 +7222,13 @@
   <p:clrMapOvr>
     <a:masterClrMapping/>
   </p:clrMapOvr>
-  <p:transition xmlns:p14="http://schemas.microsoft.com/office/powerpoint/2010/main" spd="slow">
+  <p:transition spd="slow">
     <p:cut/>
   </p:transition>
   <p:timing>
     <p:tnLst>
       <p:par>
-        <p:cTn xmlns:p14="http://schemas.microsoft.com/office/powerpoint/2010/main" id="1" dur="indefinite" restart="never" nodeType="tmRoot"/>
+        <p:cTn id="1" dur="indefinite" restart="never" nodeType="tmRoot"/>
       </p:par>
     </p:tnLst>
   </p:timing>
@@ -7223,11 +7366,7 @@
             </a:r>
             <a:r>
               <a:rPr lang="en" dirty="0" smtClean="0"/>
-              <a:t>   - Report progress and update project </a:t>
-            </a:r>
-            <a:r>
-              <a:rPr lang="en" dirty="0" smtClean="0"/>
-              <a:t>plan</a:t>
+              <a:t>   - Report progress and update project plan</a:t>
             </a:r>
             <a:endParaRPr lang="en-US" dirty="0" smtClean="0"/>
           </a:p>
@@ -7271,13 +7410,13 @@
   <p:clrMapOvr>
     <a:masterClrMapping/>
   </p:clrMapOvr>
-  <p:transition xmlns:p14="http://schemas.microsoft.com/office/powerpoint/2010/main" spd="slow">
+  <p:transition spd="slow">
     <p:cut/>
   </p:transition>
   <p:timing>
     <p:tnLst>
       <p:par>
-        <p:cTn xmlns:p14="http://schemas.microsoft.com/office/powerpoint/2010/main" id="1" dur="indefinite" restart="never" nodeType="tmRoot"/>
+        <p:cTn id="1" dur="indefinite" restart="never" nodeType="tmRoot"/>
       </p:par>
     </p:tnLst>
   </p:timing>
@@ -7459,13 +7598,13 @@
   <p:clrMapOvr>
     <a:masterClrMapping/>
   </p:clrMapOvr>
-  <p:transition xmlns:p14="http://schemas.microsoft.com/office/powerpoint/2010/main" spd="slow">
+  <p:transition spd="slow">
     <p:cut/>
   </p:transition>
   <p:timing>
     <p:tnLst>
       <p:par>
-        <p:cTn xmlns:p14="http://schemas.microsoft.com/office/powerpoint/2010/main" id="1" dur="indefinite" restart="never" nodeType="tmRoot"/>
+        <p:cTn id="1" dur="indefinite" restart="never" nodeType="tmRoot"/>
       </p:par>
     </p:tnLst>
   </p:timing>
@@ -7626,13 +7765,13 @@
   <p:clrMapOvr>
     <a:masterClrMapping/>
   </p:clrMapOvr>
-  <p:transition xmlns:p14="http://schemas.microsoft.com/office/powerpoint/2010/main" spd="slow">
+  <p:transition spd="slow">
     <p:cut/>
   </p:transition>
   <p:timing>
     <p:tnLst>
       <p:par>
-        <p:cTn xmlns:p14="http://schemas.microsoft.com/office/powerpoint/2010/main" id="1" dur="indefinite" restart="never" nodeType="tmRoot"/>
+        <p:cTn id="1" dur="indefinite" restart="never" nodeType="tmRoot"/>
       </p:par>
     </p:tnLst>
   </p:timing>
@@ -7761,13 +7900,13 @@
   <p:clrMapOvr>
     <a:masterClrMapping/>
   </p:clrMapOvr>
-  <p:transition xmlns:p14="http://schemas.microsoft.com/office/powerpoint/2010/main" spd="slow">
+  <p:transition spd="slow">
     <p:cut/>
   </p:transition>
   <p:timing>
     <p:tnLst>
       <p:par>
-        <p:cTn xmlns:p14="http://schemas.microsoft.com/office/powerpoint/2010/main" id="1" dur="indefinite" restart="never" nodeType="tmRoot"/>
+        <p:cTn id="1" dur="indefinite" restart="never" nodeType="tmRoot"/>
       </p:par>
     </p:tnLst>
   </p:timing>
@@ -7988,13 +8127,13 @@
   <p:clrMapOvr>
     <a:masterClrMapping/>
   </p:clrMapOvr>
-  <p:transition xmlns:p14="http://schemas.microsoft.com/office/powerpoint/2010/main" spd="slow">
+  <p:transition spd="slow">
     <p:cut/>
   </p:transition>
   <p:timing>
     <p:tnLst>
       <p:par>
-        <p:cTn xmlns:p14="http://schemas.microsoft.com/office/powerpoint/2010/main" id="1" dur="indefinite" restart="never" nodeType="tmRoot"/>
+        <p:cTn id="1" dur="indefinite" restart="never" nodeType="tmRoot"/>
       </p:par>
     </p:tnLst>
   </p:timing>
@@ -8206,13 +8345,13 @@
   <p:clrMapOvr>
     <a:masterClrMapping/>
   </p:clrMapOvr>
-  <p:transition xmlns:p14="http://schemas.microsoft.com/office/powerpoint/2010/main" spd="slow">
+  <p:transition spd="slow">
     <p:cut/>
   </p:transition>
   <p:timing>
     <p:tnLst>
       <p:par>
-        <p:cTn xmlns:p14="http://schemas.microsoft.com/office/powerpoint/2010/main" id="1" dur="indefinite" restart="never" nodeType="tmRoot"/>
+        <p:cTn id="1" dur="indefinite" restart="never" nodeType="tmRoot"/>
       </p:par>
     </p:tnLst>
   </p:timing>
@@ -8311,7 +8450,7 @@
               <a:buChar char="●"/>
             </a:pPr>
             <a:r>
-              <a:rPr lang="en" sz="2200"/>
+              <a:rPr lang="en" sz="2200" dirty="0"/>
               <a:t>Roles &amp; Responsibilities</a:t>
             </a:r>
           </a:p>
@@ -8328,7 +8467,7 @@
               <a:buChar char="o"/>
             </a:pPr>
             <a:r>
-              <a:rPr lang="en" sz="2200"/>
+              <a:rPr lang="en" sz="2200" dirty="0"/>
               <a:t>Project Sponsor</a:t>
             </a:r>
           </a:p>
@@ -8345,7 +8484,7 @@
               <a:buChar char="§"/>
             </a:pPr>
             <a:r>
-              <a:rPr lang="en" sz="2200"/>
+              <a:rPr lang="en" sz="2200" dirty="0"/>
               <a:t>Will propose/approve any significant changes</a:t>
             </a:r>
           </a:p>
@@ -8362,7 +8501,7 @@
               <a:buChar char="§"/>
             </a:pPr>
             <a:r>
-              <a:rPr lang="en" sz="2200"/>
+              <a:rPr lang="en" sz="2200" dirty="0"/>
               <a:t>Proposal must be submitted to team with a change request form</a:t>
             </a:r>
           </a:p>
@@ -8379,7 +8518,7 @@
               <a:buChar char="§"/>
             </a:pPr>
             <a:r>
-              <a:rPr lang="en" sz="2200"/>
+              <a:rPr lang="en" sz="2200" dirty="0"/>
               <a:t>Must meet with team to discuss proposed change</a:t>
             </a:r>
           </a:p>
@@ -8396,43 +8535,44 @@
               <a:buChar char="○"/>
             </a:pPr>
             <a:r>
-              <a:rPr lang="en" sz="2200"/>
-              <a:t>Project Manager</a:t>
-            </a:r>
-          </a:p>
-          <a:p>
-            <a:pPr marL="1371600" lvl="2" indent="-368300" rtl="0">
-              <a:spcBef>
-                <a:spcPts val="0"/>
-              </a:spcBef>
-              <a:buClr>
-                <a:schemeClr val="dk2"/>
-              </a:buClr>
-              <a:buSzPct val="100000"/>
-              <a:buFont typeface="Trebuchet MS"/>
-              <a:buChar char="■"/>
-            </a:pPr>
-            <a:r>
-              <a:rPr lang="en" sz="2200"/>
-              <a:t>Primary point of contact for 3rd parties wishing to contact team</a:t>
-            </a:r>
+              <a:rPr lang="en" sz="2200" dirty="0"/>
+              <a:t>Project </a:t>
+            </a:r>
+            <a:r>
+              <a:rPr lang="en" sz="2200" dirty="0" smtClean="0"/>
+              <a:t>Manager</a:t>
+            </a:r>
+            <a:endParaRPr lang="en" sz="2200" dirty="0"/>
           </a:p>
           <a:p>
             <a:pPr marL="1371600" lvl="2" indent="-368300">
-              <a:spcBef>
-                <a:spcPts val="0"/>
-              </a:spcBef>
-              <a:buClr>
-                <a:schemeClr val="dk2"/>
-              </a:buClr>
-              <a:buSzPct val="100000"/>
-              <a:buFont typeface="Trebuchet MS"/>
-              <a:buChar char="■"/>
-            </a:pPr>
-            <a:r>
-              <a:rPr lang="en" sz="2200"/>
+              <a:buFont typeface="Wingdings"/>
+              <a:buChar char="§"/>
+            </a:pPr>
+            <a:r>
+              <a:rPr lang="en" sz="2200" dirty="0" smtClean="0"/>
+              <a:t>Primary point of contact for 3</a:t>
+            </a:r>
+            <a:r>
+              <a:rPr lang="en" sz="2200" baseline="30000" dirty="0" smtClean="0"/>
+              <a:t>rd</a:t>
+            </a:r>
+            <a:r>
+              <a:rPr lang="en" sz="2200" dirty="0" smtClean="0"/>
+              <a:t> parties wishing to contact team</a:t>
+            </a:r>
+            <a:endParaRPr lang="en" sz="2200" dirty="0"/>
+          </a:p>
+          <a:p>
+            <a:pPr marL="1371600" lvl="2" indent="-368300">
+              <a:buFont typeface="Wingdings"/>
+              <a:buChar char="§"/>
+            </a:pPr>
+            <a:r>
+              <a:rPr lang="en" sz="2200" dirty="0" smtClean="0"/>
               <a:t>May use discretion concerning change proposals</a:t>
             </a:r>
+            <a:endParaRPr lang="en" sz="2200" dirty="0"/>
           </a:p>
         </p:txBody>
       </p:sp>
@@ -8441,13 +8581,13 @@
   <p:clrMapOvr>
     <a:masterClrMapping/>
   </p:clrMapOvr>
-  <p:transition xmlns:p14="http://schemas.microsoft.com/office/powerpoint/2010/main" spd="slow">
+  <p:transition spd="slow">
     <p:cut/>
   </p:transition>
   <p:timing>
     <p:tnLst>
       <p:par>
-        <p:cTn xmlns:p14="http://schemas.microsoft.com/office/powerpoint/2010/main" id="1" dur="indefinite" restart="never" nodeType="tmRoot"/>
+        <p:cTn id="1" dur="indefinite" restart="never" nodeType="tmRoot"/>
       </p:par>
     </p:tnLst>
   </p:timing>
@@ -8546,7 +8686,7 @@
               <a:buChar char="o"/>
             </a:pPr>
             <a:r>
-              <a:rPr lang="en"/>
+              <a:rPr lang="en" dirty="0"/>
               <a:t>Project Team</a:t>
             </a:r>
           </a:p>
@@ -8563,7 +8703,7 @@
               <a:buChar char="§"/>
             </a:pPr>
             <a:r>
-              <a:rPr lang="en"/>
+              <a:rPr lang="en" dirty="0"/>
               <a:t>Discuss and analyze proposed changes</a:t>
             </a:r>
           </a:p>
@@ -8580,7 +8720,7 @@
               <a:buChar char="§"/>
             </a:pPr>
             <a:r>
-              <a:rPr lang="en"/>
+              <a:rPr lang="en" dirty="0"/>
               <a:t>Estimate additional effort and monetary cost needed</a:t>
             </a:r>
           </a:p>
@@ -8597,7 +8737,7 @@
               <a:buChar char="§"/>
             </a:pPr>
             <a:r>
-              <a:rPr lang="en"/>
+              <a:rPr lang="en" dirty="0"/>
               <a:t>Team must come to unanimous decision for change</a:t>
             </a:r>
           </a:p>
@@ -8614,43 +8754,40 @@
               <a:buChar char="○"/>
             </a:pPr>
             <a:r>
-              <a:rPr lang="en"/>
-              <a:t>Mr. O’Dell</a:t>
-            </a:r>
-          </a:p>
-          <a:p>
-            <a:pPr marL="1371600" lvl="2" indent="-381000" rtl="0">
-              <a:spcBef>
-                <a:spcPts val="0"/>
-              </a:spcBef>
-              <a:buClr>
-                <a:schemeClr val="dk2"/>
-              </a:buClr>
-              <a:buSzPct val="80000"/>
-              <a:buFont typeface="Trebuchet MS"/>
-              <a:buChar char="■"/>
-            </a:pPr>
-            <a:r>
-              <a:rPr lang="en"/>
-              <a:t>Will be notified of approved changes</a:t>
-            </a:r>
-          </a:p>
-          <a:p>
-            <a:pPr marL="1371600" lvl="2" indent="-381000">
-              <a:spcBef>
-                <a:spcPts val="0"/>
-              </a:spcBef>
-              <a:buClr>
-                <a:schemeClr val="dk2"/>
-              </a:buClr>
-              <a:buSzPct val="80000"/>
-              <a:buFont typeface="Trebuchet MS"/>
-              <a:buChar char="■"/>
-            </a:pPr>
-            <a:r>
-              <a:rPr lang="en"/>
+              <a:rPr lang="en" dirty="0"/>
+              <a:t>Mr. </a:t>
+            </a:r>
+            <a:r>
+              <a:rPr lang="en" dirty="0" smtClean="0"/>
+              <a:t>O’Dell</a:t>
+            </a:r>
+            <a:endParaRPr lang="en" sz="2200" dirty="0"/>
+          </a:p>
+          <a:p>
+            <a:pPr marL="1371600" lvl="2" indent="-368300">
+              <a:buFont typeface="Wingdings"/>
+              <a:buChar char="§"/>
+            </a:pPr>
+            <a:r>
+              <a:rPr lang="en" sz="2200" dirty="0"/>
+              <a:t>Will </a:t>
+            </a:r>
+            <a:r>
+              <a:rPr lang="en" sz="2200" dirty="0" smtClean="0"/>
+              <a:t>be notified of approved changes</a:t>
+            </a:r>
+            <a:endParaRPr lang="en" sz="2200" dirty="0"/>
+          </a:p>
+          <a:p>
+            <a:pPr marL="1371600" lvl="2" indent="-368300">
+              <a:buFont typeface="Wingdings"/>
+              <a:buChar char="§"/>
+            </a:pPr>
+            <a:r>
+              <a:rPr lang="en" sz="2200" dirty="0" smtClean="0"/>
               <a:t>Thoughts will be taken into consideration concerning final change approval</a:t>
             </a:r>
+            <a:endParaRPr lang="en" dirty="0"/>
           </a:p>
         </p:txBody>
       </p:sp>
@@ -8659,13 +8796,13 @@
   <p:clrMapOvr>
     <a:masterClrMapping/>
   </p:clrMapOvr>
-  <p:transition xmlns:p14="http://schemas.microsoft.com/office/powerpoint/2010/main" spd="slow">
+  <p:transition spd="slow">
     <p:cut/>
   </p:transition>
   <p:timing>
     <p:tnLst>
       <p:par>
-        <p:cTn xmlns:p14="http://schemas.microsoft.com/office/powerpoint/2010/main" id="1" dur="indefinite" restart="never" nodeType="tmRoot"/>
+        <p:cTn id="1" dur="indefinite" restart="never" nodeType="tmRoot"/>
       </p:par>
     </p:tnLst>
   </p:timing>
@@ -8843,13 +8980,13 @@
   <p:clrMapOvr>
     <a:masterClrMapping/>
   </p:clrMapOvr>
-  <p:transition xmlns:p14="http://schemas.microsoft.com/office/powerpoint/2010/main" spd="slow">
+  <p:transition spd="slow">
     <p:cut/>
   </p:transition>
   <p:timing>
     <p:tnLst>
       <p:par>
-        <p:cTn xmlns:p14="http://schemas.microsoft.com/office/powerpoint/2010/main" id="1" dur="indefinite" restart="never" nodeType="tmRoot"/>
+        <p:cTn id="1" dur="indefinite" restart="never" nodeType="tmRoot"/>
       </p:par>
     </p:tnLst>
   </p:timing>
@@ -9080,13 +9217,13 @@
   <p:clrMapOvr>
     <a:masterClrMapping/>
   </p:clrMapOvr>
-  <p:transition xmlns:p14="http://schemas.microsoft.com/office/powerpoint/2010/main" spd="slow">
+  <p:transition spd="slow">
     <p:cut/>
   </p:transition>
   <p:timing>
     <p:tnLst>
       <p:par>
-        <p:cTn xmlns:p14="http://schemas.microsoft.com/office/powerpoint/2010/main" id="1" dur="indefinite" restart="never" nodeType="tmRoot"/>
+        <p:cTn id="1" dur="indefinite" restart="never" nodeType="tmRoot"/>
       </p:par>
     </p:tnLst>
   </p:timing>
@@ -9318,13 +9455,13 @@
   <p:clrMapOvr>
     <a:masterClrMapping/>
   </p:clrMapOvr>
-  <p:transition xmlns:p14="http://schemas.microsoft.com/office/powerpoint/2010/main" spd="slow">
+  <p:transition spd="slow">
     <p:cut/>
   </p:transition>
   <p:timing>
     <p:tnLst>
       <p:par>
-        <p:cTn xmlns:p14="http://schemas.microsoft.com/office/powerpoint/2010/main" id="1" dur="indefinite" restart="never" nodeType="tmRoot"/>
+        <p:cTn id="1" dur="indefinite" restart="never" nodeType="tmRoot"/>
       </p:par>
     </p:tnLst>
   </p:timing>
@@ -10266,13 +10403,13 @@
   <p:clrMapOvr>
     <a:masterClrMapping/>
   </p:clrMapOvr>
-  <p:transition xmlns:p14="http://schemas.microsoft.com/office/powerpoint/2010/main" spd="slow">
+  <p:transition spd="slow">
     <p:cut/>
   </p:transition>
   <p:timing>
     <p:tnLst>
       <p:par>
-        <p:cTn xmlns:p14="http://schemas.microsoft.com/office/powerpoint/2010/main" id="1" dur="indefinite" restart="never" nodeType="tmRoot"/>
+        <p:cTn id="1" dur="indefinite" restart="never" nodeType="tmRoot"/>
       </p:par>
     </p:tnLst>
   </p:timing>
@@ -10311,6 +10448,7 @@
           <a:bodyPr/>
           <a:lstStyle/>
           <a:p>
+            <a:pPr algn="ctr"/>
             <a:r>
               <a:rPr lang="en-US" dirty="0" smtClean="0"/>
               <a:t>Process To follow</a:t>
@@ -10380,7 +10518,7 @@
   <p:timing>
     <p:tnLst>
       <p:par>
-        <p:cTn xmlns:p14="http://schemas.microsoft.com/office/powerpoint/2010/main" id="1" dur="indefinite" restart="never" nodeType="tmRoot"/>
+        <p:cTn id="1" dur="indefinite" restart="never" nodeType="tmRoot"/>
       </p:par>
     </p:tnLst>
   </p:timing>
@@ -10579,13 +10717,13 @@
   <p:clrMapOvr>
     <a:masterClrMapping/>
   </p:clrMapOvr>
-  <p:transition xmlns:p14="http://schemas.microsoft.com/office/powerpoint/2010/main" spd="slow">
+  <p:transition spd="slow">
     <p:cut/>
   </p:transition>
   <p:timing>
     <p:tnLst>
       <p:par>
-        <p:cTn xmlns:p14="http://schemas.microsoft.com/office/powerpoint/2010/main" id="1" dur="indefinite" restart="never" nodeType="tmRoot"/>
+        <p:cTn id="1" dur="indefinite" restart="never" nodeType="tmRoot"/>
       </p:par>
     </p:tnLst>
   </p:timing>
@@ -10624,6 +10762,7 @@
           <a:bodyPr/>
           <a:lstStyle/>
           <a:p>
+            <a:pPr algn="ctr"/>
             <a:r>
               <a:rPr lang="en-US" dirty="0" smtClean="0"/>
               <a:t>Outreach Storage System Scope</a:t>
@@ -10907,13 +11046,13 @@
   <p:clrMapOvr>
     <a:masterClrMapping/>
   </p:clrMapOvr>
-  <p:transition xmlns:p14="http://schemas.microsoft.com/office/powerpoint/2010/main" spd="slow">
+  <p:transition spd="slow">
     <p:cut/>
   </p:transition>
   <p:timing>
     <p:tnLst>
       <p:par>
-        <p:cTn xmlns:p14="http://schemas.microsoft.com/office/powerpoint/2010/main" id="1" dur="indefinite" restart="never" nodeType="tmRoot"/>
+        <p:cTn id="1" dur="indefinite" restart="never" nodeType="tmRoot"/>
       </p:par>
     </p:tnLst>
   </p:timing>
@@ -11063,13 +11202,13 @@
   <p:clrMapOvr>
     <a:masterClrMapping/>
   </p:clrMapOvr>
-  <p:transition xmlns:p14="http://schemas.microsoft.com/office/powerpoint/2010/main" spd="slow">
+  <p:transition spd="slow">
     <p:cut/>
   </p:transition>
   <p:timing>
     <p:tnLst>
       <p:par>
-        <p:cTn xmlns:p14="http://schemas.microsoft.com/office/powerpoint/2010/main" id="1" dur="indefinite" restart="never" nodeType="tmRoot"/>
+        <p:cTn id="1" dur="indefinite" restart="never" nodeType="tmRoot"/>
       </p:par>
     </p:tnLst>
   </p:timing>
@@ -11173,7 +11312,7 @@
   <p:timing>
     <p:tnLst>
       <p:par>
-        <p:cTn xmlns:p14="http://schemas.microsoft.com/office/powerpoint/2010/main" id="1" dur="indefinite" restart="never" nodeType="tmRoot"/>
+        <p:cTn id="1" dur="indefinite" restart="never" nodeType="tmRoot"/>
       </p:par>
     </p:tnLst>
   </p:timing>
@@ -11212,6 +11351,7 @@
           <a:bodyPr/>
           <a:lstStyle/>
           <a:p>
+            <a:pPr algn="ctr"/>
             <a:r>
               <a:rPr lang="en-US" dirty="0" smtClean="0"/>
               <a:t>Customer and Audience</a:t>
@@ -12256,13 +12396,13 @@
   <p:clrMapOvr>
     <a:masterClrMapping/>
   </p:clrMapOvr>
-  <p:transition xmlns:p14="http://schemas.microsoft.com/office/powerpoint/2010/main" spd="slow">
+  <p:transition spd="slow">
     <p:cut/>
   </p:transition>
   <p:timing>
     <p:tnLst>
       <p:par>
-        <p:cTn xmlns:p14="http://schemas.microsoft.com/office/powerpoint/2010/main" id="1" dur="indefinite" restart="never" nodeType="tmRoot"/>
+        <p:cTn id="1" dur="indefinite" restart="never" nodeType="tmRoot"/>
       </p:par>
     </p:tnLst>
   </p:timing>
@@ -12489,13 +12629,13 @@
   <p:clrMapOvr>
     <a:masterClrMapping/>
   </p:clrMapOvr>
-  <p:transition xmlns:p14="http://schemas.microsoft.com/office/powerpoint/2010/main" spd="slow">
+  <p:transition spd="slow">
     <p:cut/>
   </p:transition>
   <p:timing>
     <p:tnLst>
       <p:par>
-        <p:cTn xmlns:p14="http://schemas.microsoft.com/office/powerpoint/2010/main" id="1" dur="indefinite" restart="never" nodeType="tmRoot"/>
+        <p:cTn id="1" dur="indefinite" restart="never" nodeType="tmRoot"/>
       </p:par>
     </p:tnLst>
   </p:timing>
@@ -12747,13 +12887,13 @@
   <p:clrMapOvr>
     <a:masterClrMapping/>
   </p:clrMapOvr>
-  <p:transition xmlns:p14="http://schemas.microsoft.com/office/powerpoint/2010/main" spd="slow">
+  <p:transition spd="slow">
     <p:cut/>
   </p:transition>
   <p:timing>
     <p:tnLst>
       <p:par>
-        <p:cTn xmlns:p14="http://schemas.microsoft.com/office/powerpoint/2010/main" id="1" dur="indefinite" restart="never" nodeType="tmRoot"/>
+        <p:cTn id="1" dur="indefinite" restart="never" nodeType="tmRoot"/>
       </p:par>
     </p:tnLst>
   </p:timing>
@@ -13008,13 +13148,13 @@
   <p:clrMapOvr>
     <a:masterClrMapping/>
   </p:clrMapOvr>
-  <p:transition xmlns:p14="http://schemas.microsoft.com/office/powerpoint/2010/main" spd="slow">
+  <p:transition spd="slow">
     <p:cut/>
   </p:transition>
   <p:timing>
     <p:tnLst>
       <p:par>
-        <p:cTn xmlns:p14="http://schemas.microsoft.com/office/powerpoint/2010/main" id="1" dur="indefinite" restart="never" nodeType="tmRoot"/>
+        <p:cTn id="1" dur="indefinite" restart="never" nodeType="tmRoot"/>
       </p:par>
     </p:tnLst>
   </p:timing>
@@ -13317,13 +13457,13 @@
   <p:clrMapOvr>
     <a:masterClrMapping/>
   </p:clrMapOvr>
-  <p:transition xmlns:p14="http://schemas.microsoft.com/office/powerpoint/2010/main" spd="slow">
+  <p:transition spd="slow">
     <p:cut/>
   </p:transition>
   <p:timing>
     <p:tnLst>
       <p:par>
-        <p:cTn xmlns:p14="http://schemas.microsoft.com/office/powerpoint/2010/main" id="1" dur="indefinite" restart="never" nodeType="tmRoot"/>
+        <p:cTn id="1" dur="indefinite" restart="never" nodeType="tmRoot"/>
       </p:par>
     </p:tnLst>
   </p:timing>

</xml_diff>